<commit_message>
conclusion in presentation & now working qr code
</commit_message>
<xml_diff>
--- a/documents/Eindpresentatie/webrtc.pptx
+++ b/documents/Eindpresentatie/webrtc.pptx
@@ -5,10 +5,10 @@
     <p:sldMasterId id="2147483649" r:id="rId1"/>
   </p:sldMasterIdLst>
   <p:notesMasterIdLst>
-    <p:notesMasterId r:id="rId15"/>
+    <p:notesMasterId r:id="rId16"/>
   </p:notesMasterIdLst>
   <p:handoutMasterIdLst>
-    <p:handoutMasterId r:id="rId16"/>
+    <p:handoutMasterId r:id="rId17"/>
   </p:handoutMasterIdLst>
   <p:sldIdLst>
     <p:sldId id="377" r:id="rId2"/>
@@ -23,7 +23,8 @@
     <p:sldId id="387" r:id="rId11"/>
     <p:sldId id="388" r:id="rId12"/>
     <p:sldId id="389" r:id="rId13"/>
-    <p:sldId id="390" r:id="rId14"/>
+    <p:sldId id="391" r:id="rId14"/>
+    <p:sldId id="390" r:id="rId15"/>
   </p:sldIdLst>
   <p:sldSz cx="9144000" cy="6858000" type="screen4x3"/>
   <p:notesSz cx="6794500" cy="9931400"/>
@@ -1177,7 +1178,7 @@
           <a:bodyPr/>
           <a:lstStyle/>
           <a:p>
-            <a:endParaRPr lang="nl-NL"/>
+            <a:endParaRPr lang="nl-NL" dirty="0"/>
           </a:p>
         </p:txBody>
       </p:sp>
@@ -1262,7 +1263,7 @@
           <a:bodyPr/>
           <a:lstStyle/>
           <a:p>
-            <a:endParaRPr lang="nl-NL"/>
+            <a:endParaRPr lang="nl-NL" dirty="0"/>
           </a:p>
         </p:txBody>
       </p:sp>
@@ -1285,6 +1286,91 @@
               <a:rPr lang="en-US" smtClean="0"/>
               <a:pPr/>
               <a:t>13</a:t>
+            </a:fld>
+            <a:endParaRPr lang="en-US"/>
+          </a:p>
+        </p:txBody>
+      </p:sp>
+    </p:spTree>
+    <p:extLst>
+      <p:ext uri="{BB962C8B-B14F-4D97-AF65-F5344CB8AC3E}">
+        <p14:creationId xmlns:p14="http://schemas.microsoft.com/office/powerpoint/2010/main" val="3459283393"/>
+      </p:ext>
+    </p:extLst>
+  </p:cSld>
+  <p:clrMapOvr>
+    <a:masterClrMapping/>
+  </p:clrMapOvr>
+</p:notes>
+</file>
+
+<file path=ppt/notesSlides/notesSlide14.xml><?xml version="1.0" encoding="utf-8"?>
+<p:notes xmlns:a="http://schemas.openxmlformats.org/drawingml/2006/main" xmlns:r="http://schemas.openxmlformats.org/officeDocument/2006/relationships" xmlns:p="http://schemas.openxmlformats.org/presentationml/2006/main">
+  <p:cSld>
+    <p:spTree>
+      <p:nvGrpSpPr>
+        <p:cNvPr id="1" name=""/>
+        <p:cNvGrpSpPr/>
+        <p:nvPr/>
+      </p:nvGrpSpPr>
+      <p:grpSpPr>
+        <a:xfrm>
+          <a:off x="0" y="0"/>
+          <a:ext cx="0" cy="0"/>
+          <a:chOff x="0" y="0"/>
+          <a:chExt cx="0" cy="0"/>
+        </a:xfrm>
+      </p:grpSpPr>
+      <p:sp>
+        <p:nvSpPr>
+          <p:cNvPr id="2" name="Slide Image Placeholder 1"/>
+          <p:cNvSpPr>
+            <a:spLocks noGrp="1" noRot="1" noChangeAspect="1"/>
+          </p:cNvSpPr>
+          <p:nvPr>
+            <p:ph type="sldImg"/>
+          </p:nvPr>
+        </p:nvSpPr>
+        <p:spPr/>
+      </p:sp>
+      <p:sp>
+        <p:nvSpPr>
+          <p:cNvPr id="3" name="Notes Placeholder 2"/>
+          <p:cNvSpPr>
+            <a:spLocks noGrp="1"/>
+          </p:cNvSpPr>
+          <p:nvPr>
+            <p:ph type="body" idx="1"/>
+          </p:nvPr>
+        </p:nvSpPr>
+        <p:spPr/>
+        <p:txBody>
+          <a:bodyPr/>
+          <a:lstStyle/>
+          <a:p>
+            <a:endParaRPr lang="nl-NL"/>
+          </a:p>
+        </p:txBody>
+      </p:sp>
+      <p:sp>
+        <p:nvSpPr>
+          <p:cNvPr id="4" name="Slide Number Placeholder 3"/>
+          <p:cNvSpPr>
+            <a:spLocks noGrp="1"/>
+          </p:cNvSpPr>
+          <p:nvPr>
+            <p:ph type="sldNum" sz="quarter" idx="10"/>
+          </p:nvPr>
+        </p:nvSpPr>
+        <p:spPr/>
+        <p:txBody>
+          <a:bodyPr/>
+          <a:lstStyle/>
+          <a:p>
+            <a:fld id="{DDECF328-74EB-4684-8EC0-128B8857C3CD}" type="slidenum">
+              <a:rPr lang="en-US" smtClean="0"/>
+              <a:pPr/>
+              <a:t>14</a:t>
             </a:fld>
             <a:endParaRPr lang="en-US"/>
           </a:p>
@@ -5649,11 +5735,11 @@
           <a:lstStyle/>
           <a:p>
             <a:r>
-              <a:rPr lang="nl-NL" sz="1400" b="1" dirty="0" err="1" smtClean="0"/>
+              <a:rPr lang="en-GB" sz="1400" b="1" dirty="0" smtClean="0"/>
               <a:t>Welcome</a:t>
             </a:r>
             <a:r>
-              <a:rPr lang="nl-NL" sz="1200" baseline="0" dirty="0" smtClean="0">
+              <a:rPr lang="en-GB" sz="1200" baseline="0" dirty="0" smtClean="0">
                 <a:solidFill>
                   <a:schemeClr val="bg1">
                     <a:lumMod val="65000"/>
@@ -5663,7 +5749,7 @@
               <a:t>● </a:t>
             </a:r>
             <a:r>
-              <a:rPr lang="nl-NL" sz="1200" dirty="0" err="1" smtClean="0">
+              <a:rPr lang="en-GB" sz="1200" dirty="0" smtClean="0">
                 <a:solidFill>
                   <a:schemeClr val="bg1">
                     <a:lumMod val="65000"/>
@@ -5673,7 +5759,7 @@
               <a:t>Assignment</a:t>
             </a:r>
             <a:r>
-              <a:rPr lang="nl-NL" sz="1200" baseline="0" dirty="0" smtClean="0">
+              <a:rPr lang="en-GB" sz="1200" baseline="0" dirty="0" smtClean="0">
                 <a:solidFill>
                   <a:schemeClr val="bg1">
                     <a:lumMod val="65000"/>
@@ -5683,116 +5769,36 @@
               <a:t>● </a:t>
             </a:r>
             <a:r>
-              <a:rPr lang="nl-NL" sz="1200" b="0" baseline="0" dirty="0" smtClean="0">
-                <a:solidFill>
-                  <a:schemeClr val="bg1">
-                    <a:lumMod val="65000"/>
-                  </a:schemeClr>
-                </a:solidFill>
-              </a:rPr>
-              <a:t>WebRTC ● Peer-</a:t>
-            </a:r>
-            <a:r>
-              <a:rPr lang="nl-NL" sz="1200" b="0" baseline="0" dirty="0" err="1" smtClean="0">
-                <a:solidFill>
-                  <a:schemeClr val="bg1">
-                    <a:lumMod val="65000"/>
-                  </a:schemeClr>
-                </a:solidFill>
-              </a:rPr>
-              <a:t>to</a:t>
-            </a:r>
-            <a:r>
-              <a:rPr lang="nl-NL" sz="1200" b="0" baseline="0" dirty="0" smtClean="0">
-                <a:solidFill>
-                  <a:schemeClr val="bg1">
-                    <a:lumMod val="65000"/>
-                  </a:schemeClr>
-                </a:solidFill>
-              </a:rPr>
-              <a:t>-Peer ● </a:t>
-            </a:r>
-            <a:r>
-              <a:rPr lang="nl-NL" sz="1200" baseline="0" dirty="0" smtClean="0">
-                <a:solidFill>
-                  <a:schemeClr val="bg1">
-                    <a:lumMod val="65000"/>
-                  </a:schemeClr>
-                </a:solidFill>
-              </a:rPr>
-              <a:t>Game ● Technology ● </a:t>
-            </a:r>
-            <a:r>
-              <a:rPr lang="nl-NL" sz="1200" baseline="0" dirty="0" err="1" smtClean="0">
-                <a:solidFill>
-                  <a:schemeClr val="bg1">
-                    <a:lumMod val="65000"/>
-                  </a:schemeClr>
-                </a:solidFill>
-              </a:rPr>
-              <a:t>Quality</a:t>
-            </a:r>
-            <a:r>
-              <a:rPr lang="nl-NL" sz="1200" baseline="0" dirty="0" smtClean="0">
-                <a:solidFill>
-                  <a:schemeClr val="bg1">
-                    <a:lumMod val="65000"/>
-                  </a:schemeClr>
-                </a:solidFill>
-              </a:rPr>
-              <a:t> &amp; Testing </a:t>
-            </a:r>
-            <a:r>
-              <a:rPr lang="nl-NL" sz="1200" dirty="0">
-                <a:solidFill>
-                  <a:schemeClr val="bg1">
-                    <a:lumMod val="65000"/>
-                  </a:schemeClr>
-                </a:solidFill>
-              </a:rPr>
-              <a:t>● </a:t>
-            </a:r>
-            <a:r>
-              <a:rPr lang="nl-NL" sz="1200" dirty="0" err="1" smtClean="0">
-                <a:solidFill>
-                  <a:schemeClr val="bg1">
-                    <a:lumMod val="65000"/>
-                  </a:schemeClr>
-                </a:solidFill>
-              </a:rPr>
-              <a:t>Conclusion</a:t>
-            </a:r>
-            <a:r>
-              <a:rPr lang="nl-NL" sz="1200" dirty="0" smtClean="0">
-                <a:solidFill>
-                  <a:schemeClr val="bg1">
-                    <a:lumMod val="65000"/>
-                  </a:schemeClr>
-                </a:solidFill>
-              </a:rPr>
-              <a:t> ● </a:t>
-            </a:r>
-            <a:r>
-              <a:rPr lang="nl-NL" sz="1200" dirty="0" err="1" smtClean="0">
-                <a:solidFill>
-                  <a:schemeClr val="bg1">
-                    <a:lumMod val="65000"/>
-                  </a:schemeClr>
-                </a:solidFill>
-              </a:rPr>
-              <a:t>Questions</a:t>
-            </a:r>
-            <a:r>
-              <a:rPr lang="nl-NL" sz="1200" dirty="0" smtClean="0">
-                <a:solidFill>
-                  <a:schemeClr val="bg1">
-                    <a:lumMod val="65000"/>
-                  </a:schemeClr>
-                </a:solidFill>
-              </a:rPr>
-              <a:t>?</a:t>
-            </a:r>
-            <a:endParaRPr lang="nl-NL" sz="1200" dirty="0">
+              <a:rPr lang="en-GB" sz="1200" b="0" baseline="0" dirty="0" smtClean="0">
+                <a:solidFill>
+                  <a:schemeClr val="bg1">
+                    <a:lumMod val="65000"/>
+                  </a:schemeClr>
+                </a:solidFill>
+              </a:rPr>
+              <a:t>WebRTC ● Peer-to-Peer ● </a:t>
+            </a:r>
+            <a:r>
+              <a:rPr lang="en-GB" sz="1200" baseline="0" dirty="0" smtClean="0">
+                <a:solidFill>
+                  <a:schemeClr val="bg1">
+                    <a:lumMod val="65000"/>
+                  </a:schemeClr>
+                </a:solidFill>
+              </a:rPr>
+              <a:t>Game ● Technology ● Quality &amp; Testing </a:t>
+            </a:r>
+            <a:r>
+              <a:rPr lang="en-GB" sz="1200" dirty="0" smtClean="0">
+                <a:solidFill>
+                  <a:schemeClr val="bg1">
+                    <a:lumMod val="65000"/>
+                  </a:schemeClr>
+                </a:solidFill>
+              </a:rPr>
+              <a:t>● Conclusion ● Questions?</a:t>
+            </a:r>
+            <a:endParaRPr lang="en-GB" sz="1200" dirty="0">
               <a:solidFill>
                 <a:schemeClr val="bg1">
                   <a:lumMod val="65000"/>
@@ -6359,7 +6365,40 @@
                   </a:schemeClr>
                 </a:solidFill>
               </a:rPr>
-              <a:t>subtitle</a:t>
+              <a:t>Reflection </a:t>
+            </a:r>
+            <a:r>
+              <a:rPr lang="en-GB" sz="2400" dirty="0" smtClean="0">
+                <a:solidFill>
+                  <a:schemeClr val="accent6">
+                    <a:lumMod val="50000"/>
+                    <a:lumOff val="50000"/>
+                  </a:schemeClr>
+                </a:solidFill>
+              </a:rPr>
+              <a:t>on</a:t>
+            </a:r>
+            <a:r>
+              <a:rPr lang="en-GB" sz="2400" dirty="0" smtClean="0">
+                <a:solidFill>
+                  <a:schemeClr val="accent6">
+                    <a:lumMod val="50000"/>
+                    <a:lumOff val="50000"/>
+                  </a:schemeClr>
+                </a:solidFill>
+              </a:rPr>
+              <a:t> </a:t>
+            </a:r>
+            <a:r>
+              <a:rPr lang="en-GB" sz="2400" dirty="0" smtClean="0">
+                <a:solidFill>
+                  <a:schemeClr val="accent6">
+                    <a:lumMod val="50000"/>
+                    <a:lumOff val="50000"/>
+                  </a:schemeClr>
+                </a:solidFill>
+              </a:rPr>
+              <a:t>research question</a:t>
             </a:r>
             <a:endParaRPr lang="en-GB" sz="2400" dirty="0">
               <a:solidFill>
@@ -6388,6 +6427,66 @@
           <a:lstStyle/>
           <a:p>
             <a:pPr lvl="1"/>
+            <a:r>
+              <a:rPr lang="en-US" dirty="0" smtClean="0"/>
+              <a:t>In </a:t>
+            </a:r>
+            <a:r>
+              <a:rPr lang="en-US" dirty="0"/>
+              <a:t>what way can one create a dynamic peer-to-peer multiplayer-game-network-topology that scales with the amount of users participating by only using WebRTC</a:t>
+            </a:r>
+            <a:r>
+              <a:rPr lang="en-US" dirty="0" smtClean="0"/>
+              <a:t>?</a:t>
+            </a:r>
+          </a:p>
+          <a:p>
+            <a:pPr lvl="1"/>
+            <a:endParaRPr lang="en-US" dirty="0" smtClean="0"/>
+          </a:p>
+          <a:p>
+            <a:pPr lvl="2"/>
+            <a:r>
+              <a:rPr lang="en-US" dirty="0" smtClean="0"/>
+              <a:t>How </a:t>
+            </a:r>
+            <a:r>
+              <a:rPr lang="en-US" dirty="0"/>
+              <a:t>can one distribute essential network tasks over all peers</a:t>
+            </a:r>
+            <a:r>
+              <a:rPr lang="en-US" dirty="0" smtClean="0"/>
+              <a:t>?</a:t>
+            </a:r>
+          </a:p>
+          <a:p>
+            <a:pPr lvl="2"/>
+            <a:r>
+              <a:rPr lang="en-US" dirty="0" smtClean="0"/>
+              <a:t>How </a:t>
+            </a:r>
+            <a:r>
+              <a:rPr lang="en-US" dirty="0"/>
+              <a:t>can the impact of unpredictable circumstances (peers suddenly leaving the network) be reduced</a:t>
+            </a:r>
+            <a:r>
+              <a:rPr lang="en-US" dirty="0" smtClean="0"/>
+              <a:t>?</a:t>
+            </a:r>
+          </a:p>
+          <a:p>
+            <a:pPr lvl="2"/>
+            <a:r>
+              <a:rPr lang="en-US" dirty="0" smtClean="0"/>
+              <a:t>How </a:t>
+            </a:r>
+            <a:r>
+              <a:rPr lang="en-US" dirty="0"/>
+              <a:t>can all data reach all peers in a bandwidth-efficient way?</a:t>
+            </a:r>
+          </a:p>
+          <a:p>
+            <a:pPr lvl="2"/>
             <a:endParaRPr lang="en-GB" dirty="0"/>
           </a:p>
         </p:txBody>
@@ -6580,6 +6679,329 @@
           <a:p>
             <a:r>
               <a:rPr lang="en-GB" dirty="0" smtClean="0"/>
+              <a:t>Conclusion</a:t>
+            </a:r>
+            <a:br>
+              <a:rPr lang="en-GB" dirty="0" smtClean="0"/>
+            </a:br>
+            <a:r>
+              <a:rPr lang="en-GB" sz="2400" dirty="0" smtClean="0">
+                <a:solidFill>
+                  <a:schemeClr val="accent6">
+                    <a:lumMod val="50000"/>
+                    <a:lumOff val="50000"/>
+                  </a:schemeClr>
+                </a:solidFill>
+              </a:rPr>
+              <a:t>WebRTC impact</a:t>
+            </a:r>
+            <a:endParaRPr lang="en-GB" sz="2400" dirty="0">
+              <a:solidFill>
+                <a:schemeClr val="accent6">
+                  <a:lumMod val="50000"/>
+                  <a:lumOff val="50000"/>
+                </a:schemeClr>
+              </a:solidFill>
+            </a:endParaRPr>
+          </a:p>
+        </p:txBody>
+      </p:sp>
+      <p:sp>
+        <p:nvSpPr>
+          <p:cNvPr id="3" name="Content Placeholder 2"/>
+          <p:cNvSpPr>
+            <a:spLocks noGrp="1"/>
+          </p:cNvSpPr>
+          <p:nvPr>
+            <p:ph idx="1"/>
+          </p:nvPr>
+        </p:nvSpPr>
+        <p:spPr/>
+        <p:txBody>
+          <a:bodyPr/>
+          <a:lstStyle/>
+          <a:p>
+            <a:pPr lvl="1"/>
+            <a:endParaRPr lang="en-GB" dirty="0" smtClean="0"/>
+          </a:p>
+          <a:p>
+            <a:pPr lvl="1"/>
+            <a:r>
+              <a:rPr lang="en-GB" dirty="0" smtClean="0"/>
+              <a:t>Turbulent </a:t>
+            </a:r>
+            <a:r>
+              <a:rPr lang="en-GB" dirty="0" smtClean="0"/>
+              <a:t>growth of knowledge on internet</a:t>
+            </a:r>
+          </a:p>
+          <a:p>
+            <a:pPr lvl="1"/>
+            <a:r>
+              <a:rPr lang="en-GB" dirty="0" smtClean="0"/>
+              <a:t>Easy accessible with WebRTC libraries</a:t>
+            </a:r>
+          </a:p>
+          <a:p>
+            <a:pPr lvl="1"/>
+            <a:r>
+              <a:rPr lang="en-GB" dirty="0" smtClean="0"/>
+              <a:t>Benefits from growth of </a:t>
+            </a:r>
+            <a:r>
+              <a:rPr lang="en-GB" dirty="0" smtClean="0"/>
+              <a:t>JavaScript and HTML5 web applications</a:t>
+            </a:r>
+            <a:endParaRPr lang="en-GB" dirty="0" smtClean="0"/>
+          </a:p>
+          <a:p>
+            <a:pPr lvl="1"/>
+            <a:r>
+              <a:rPr lang="en-GB" dirty="0" smtClean="0"/>
+              <a:t>Browser dominance vs. Desktop applications</a:t>
+            </a:r>
+          </a:p>
+          <a:p>
+            <a:pPr lvl="1"/>
+            <a:r>
+              <a:rPr lang="en-GB" dirty="0" smtClean="0"/>
+              <a:t>Browser compatibility still an issue</a:t>
+            </a:r>
+          </a:p>
+          <a:p>
+            <a:pPr lvl="1"/>
+            <a:endParaRPr lang="en-GB" dirty="0"/>
+          </a:p>
+          <a:p>
+            <a:pPr lvl="1"/>
+            <a:r>
+              <a:rPr lang="en-GB" dirty="0" smtClean="0"/>
+              <a:t>Expected a continuous growth in the next years</a:t>
+            </a:r>
+          </a:p>
+          <a:p>
+            <a:pPr lvl="1"/>
+            <a:endParaRPr lang="en-GB" dirty="0" smtClean="0"/>
+          </a:p>
+          <a:p>
+            <a:pPr lvl="1"/>
+            <a:endParaRPr lang="en-GB" dirty="0"/>
+          </a:p>
+          <a:p>
+            <a:pPr lvl="1"/>
+            <a:endParaRPr lang="en-GB" dirty="0" smtClean="0"/>
+          </a:p>
+          <a:p>
+            <a:pPr lvl="1"/>
+            <a:endParaRPr lang="en-GB" dirty="0"/>
+          </a:p>
+        </p:txBody>
+      </p:sp>
+      <p:sp>
+        <p:nvSpPr>
+          <p:cNvPr id="6" name="TextBox 5"/>
+          <p:cNvSpPr txBox="1"/>
+          <p:nvPr/>
+        </p:nvSpPr>
+        <p:spPr>
+          <a:xfrm>
+            <a:off x="0" y="5764306"/>
+            <a:ext cx="9144000" cy="307777"/>
+          </a:xfrm>
+          <a:prstGeom prst="rect">
+            <a:avLst/>
+          </a:prstGeom>
+          <a:noFill/>
+        </p:spPr>
+        <p:txBody>
+          <a:bodyPr wrap="square" rtlCol="0">
+            <a:spAutoFit/>
+          </a:bodyPr>
+          <a:lstStyle/>
+          <a:p>
+            <a:r>
+              <a:rPr lang="en-GB" sz="1200" dirty="0" smtClean="0">
+                <a:solidFill>
+                  <a:schemeClr val="bg1">
+                    <a:lumMod val="65000"/>
+                  </a:schemeClr>
+                </a:solidFill>
+              </a:rPr>
+              <a:t>Welcome </a:t>
+            </a:r>
+            <a:r>
+              <a:rPr lang="en-GB" sz="1200" baseline="0" dirty="0" smtClean="0">
+                <a:solidFill>
+                  <a:schemeClr val="bg1">
+                    <a:lumMod val="65000"/>
+                  </a:schemeClr>
+                </a:solidFill>
+              </a:rPr>
+              <a:t>● </a:t>
+            </a:r>
+            <a:r>
+              <a:rPr lang="en-GB" sz="1200" dirty="0" smtClean="0">
+                <a:solidFill>
+                  <a:schemeClr val="bg1">
+                    <a:lumMod val="65000"/>
+                  </a:schemeClr>
+                </a:solidFill>
+              </a:rPr>
+              <a:t>Assignment </a:t>
+            </a:r>
+            <a:r>
+              <a:rPr lang="en-GB" sz="1200" baseline="0" dirty="0" smtClean="0">
+                <a:solidFill>
+                  <a:schemeClr val="bg1">
+                    <a:lumMod val="65000"/>
+                  </a:schemeClr>
+                </a:solidFill>
+              </a:rPr>
+              <a:t>● WebRTC</a:t>
+            </a:r>
+            <a:r>
+              <a:rPr lang="en-GB" sz="1200" b="0" baseline="0" dirty="0" smtClean="0"/>
+              <a:t> </a:t>
+            </a:r>
+            <a:r>
+              <a:rPr lang="en-GB" sz="1200" b="0" baseline="0" dirty="0" smtClean="0">
+                <a:solidFill>
+                  <a:schemeClr val="bg1">
+                    <a:lumMod val="65000"/>
+                  </a:schemeClr>
+                </a:solidFill>
+              </a:rPr>
+              <a:t>● </a:t>
+            </a:r>
+            <a:r>
+              <a:rPr lang="en-GB" sz="1200" baseline="0" dirty="0" smtClean="0">
+                <a:solidFill>
+                  <a:schemeClr val="bg1">
+                    <a:lumMod val="65000"/>
+                  </a:schemeClr>
+                </a:solidFill>
+              </a:rPr>
+              <a:t>Peer-to-Peer</a:t>
+            </a:r>
+            <a:r>
+              <a:rPr lang="en-GB" sz="1200" b="0" baseline="0" dirty="0" smtClean="0">
+                <a:solidFill>
+                  <a:schemeClr val="bg1">
+                    <a:lumMod val="65000"/>
+                  </a:schemeClr>
+                </a:solidFill>
+              </a:rPr>
+              <a:t> ● </a:t>
+            </a:r>
+            <a:r>
+              <a:rPr lang="en-GB" sz="1200" baseline="0" dirty="0" smtClean="0">
+                <a:solidFill>
+                  <a:schemeClr val="bg1">
+                    <a:lumMod val="65000"/>
+                  </a:schemeClr>
+                </a:solidFill>
+              </a:rPr>
+              <a:t>Game ● Technology ● Quality &amp; Testing ● </a:t>
+            </a:r>
+            <a:r>
+              <a:rPr lang="en-GB" sz="1400" b="1" baseline="0" dirty="0" smtClean="0"/>
+              <a:t>Conclusion</a:t>
+            </a:r>
+            <a:r>
+              <a:rPr lang="en-GB" sz="1200" baseline="0" dirty="0" smtClean="0"/>
+              <a:t> </a:t>
+            </a:r>
+            <a:r>
+              <a:rPr lang="en-GB" sz="1200" dirty="0" smtClean="0">
+                <a:solidFill>
+                  <a:schemeClr val="bg1">
+                    <a:lumMod val="65000"/>
+                  </a:schemeClr>
+                </a:solidFill>
+              </a:rPr>
+              <a:t>● Questions?</a:t>
+            </a:r>
+            <a:endParaRPr lang="en-GB" sz="1200" dirty="0">
+              <a:solidFill>
+                <a:schemeClr val="bg1">
+                  <a:lumMod val="65000"/>
+                </a:schemeClr>
+              </a:solidFill>
+            </a:endParaRPr>
+          </a:p>
+        </p:txBody>
+      </p:sp>
+    </p:spTree>
+    <p:extLst>
+      <p:ext uri="{BB962C8B-B14F-4D97-AF65-F5344CB8AC3E}">
+        <p14:creationId xmlns:p14="http://schemas.microsoft.com/office/powerpoint/2010/main" val="2291128860"/>
+      </p:ext>
+    </p:extLst>
+  </p:cSld>
+  <p:clrMapOvr>
+    <a:masterClrMapping/>
+  </p:clrMapOvr>
+  <p:timing>
+    <p:tnLst>
+      <p:par>
+        <p:cTn id="1" dur="indefinite" restart="never" nodeType="tmRoot"/>
+      </p:par>
+    </p:tnLst>
+  </p:timing>
+</p:sld>
+</file>
+
+<file path=ppt/slides/slide14.xml><?xml version="1.0" encoding="utf-8"?>
+<p:sld xmlns:a="http://schemas.openxmlformats.org/drawingml/2006/main" xmlns:r="http://schemas.openxmlformats.org/officeDocument/2006/relationships" xmlns:p="http://schemas.openxmlformats.org/presentationml/2006/main">
+  <p:cSld>
+    <p:spTree>
+      <p:nvGrpSpPr>
+        <p:cNvPr id="1" name=""/>
+        <p:cNvGrpSpPr/>
+        <p:nvPr/>
+      </p:nvGrpSpPr>
+      <p:grpSpPr>
+        <a:xfrm>
+          <a:off x="0" y="0"/>
+          <a:ext cx="0" cy="0"/>
+          <a:chOff x="0" y="0"/>
+          <a:chExt cx="0" cy="0"/>
+        </a:xfrm>
+      </p:grpSpPr>
+      <p:sp>
+        <p:nvSpPr>
+          <p:cNvPr id="2" name="Title 1"/>
+          <p:cNvSpPr>
+            <a:spLocks noGrp="1"/>
+          </p:cNvSpPr>
+          <p:nvPr>
+            <p:ph type="title"/>
+          </p:nvPr>
+        </p:nvSpPr>
+        <p:spPr>
+          <a:xfrm>
+            <a:off x="992187" y="259773"/>
+            <a:ext cx="7159625" cy="1244600"/>
+          </a:xfrm>
+        </p:spPr>
+        <p:txBody>
+          <a:bodyPr/>
+          <a:lstStyle/>
+          <a:p>
+            <a:pPr algn="ctr"/>
+            <a:r>
+              <a:rPr lang="en-GB" dirty="0" smtClean="0"/>
+              <a:t/>
+            </a:r>
+            <a:br>
+              <a:rPr lang="en-GB" dirty="0" smtClean="0"/>
+            </a:br>
+            <a:r>
+              <a:rPr lang="en-GB" sz="4800" dirty="0" smtClean="0"/>
+              <a:t>Questions?</a:t>
+            </a:r>
+            <a:r>
+              <a:rPr lang="en-GB" dirty="0" smtClean="0"/>
               <a:t/>
             </a:r>
             <a:br>
@@ -6612,7 +7034,74 @@
           <a:lstStyle/>
           <a:p>
             <a:pPr lvl="1"/>
+            <a:endParaRPr lang="en-GB" dirty="0" smtClean="0"/>
+          </a:p>
+          <a:p>
+            <a:pPr lvl="1"/>
+            <a:r>
+              <a:rPr lang="en-GB" dirty="0" smtClean="0"/>
+              <a:t>Library repository</a:t>
+            </a:r>
+            <a:br>
+              <a:rPr lang="en-GB" dirty="0" smtClean="0"/>
+            </a:br>
+            <a:r>
+              <a:rPr lang="en-GB" dirty="0" smtClean="0"/>
+              <a:t>Link</a:t>
+            </a:r>
+          </a:p>
+          <a:p>
+            <a:pPr lvl="1"/>
             <a:endParaRPr lang="en-GB" dirty="0"/>
+          </a:p>
+          <a:p>
+            <a:pPr lvl="1"/>
+            <a:r>
+              <a:rPr lang="en-GB" dirty="0" smtClean="0"/>
+              <a:t>Game repository</a:t>
+            </a:r>
+            <a:br>
+              <a:rPr lang="en-GB" dirty="0" smtClean="0"/>
+            </a:br>
+            <a:r>
+              <a:rPr lang="en-GB" dirty="0" smtClean="0"/>
+              <a:t>Link</a:t>
+            </a:r>
+          </a:p>
+          <a:p>
+            <a:pPr lvl="1"/>
+            <a:endParaRPr lang="en-GB" dirty="0"/>
+          </a:p>
+          <a:p>
+            <a:pPr lvl="1"/>
+            <a:r>
+              <a:rPr lang="en-GB" dirty="0" smtClean="0"/>
+              <a:t>Orbit Impossible</a:t>
+            </a:r>
+            <a:br>
+              <a:rPr lang="en-GB" dirty="0" smtClean="0"/>
+            </a:br>
+            <a:r>
+              <a:rPr lang="en-GB" dirty="0" smtClean="0">
+                <a:hlinkClick r:id="rId3"/>
+              </a:rPr>
+              <a:t>http://webrtc.jstfy.com/</a:t>
+            </a:r>
+            <a:endParaRPr lang="en-GB" dirty="0" smtClean="0"/>
+          </a:p>
+          <a:p>
+            <a:pPr lvl="1"/>
+            <a:endParaRPr lang="en-GB" dirty="0"/>
+          </a:p>
+          <a:p>
+            <a:pPr marL="766763" lvl="2" indent="0" algn="ctr">
+              <a:buNone/>
+            </a:pPr>
+            <a:r>
+              <a:rPr lang="en-GB" b="1" dirty="0" smtClean="0"/>
+              <a:t>Play, Download and Contribute!</a:t>
+            </a:r>
+            <a:endParaRPr lang="en-GB" b="1" dirty="0"/>
           </a:p>
         </p:txBody>
       </p:sp>
@@ -8355,7 +8844,12 @@
             <p:ph type="title"/>
           </p:nvPr>
         </p:nvSpPr>
-        <p:spPr/>
+        <p:spPr>
+          <a:xfrm>
+            <a:off x="917576" y="457200"/>
+            <a:ext cx="7159625" cy="914400"/>
+          </a:xfrm>
+        </p:spPr>
         <p:txBody>
           <a:bodyPr/>
           <a:lstStyle/>
@@ -8376,7 +8870,7 @@
                   </a:schemeClr>
                 </a:solidFill>
               </a:rPr>
-              <a:t>Demonstration</a:t>
+              <a:t>Live demonstration</a:t>
             </a:r>
             <a:endParaRPr lang="en-GB" sz="2400" dirty="0">
               <a:solidFill>
@@ -8509,30 +9003,35 @@
           </a:p>
         </p:txBody>
       </p:sp>
-      <p:sp>
-        <p:nvSpPr>
-          <p:cNvPr id="5" name="Content Placeholder 4"/>
-          <p:cNvSpPr>
-            <a:spLocks noGrp="1"/>
-          </p:cNvSpPr>
+      <p:pic>
+        <p:nvPicPr>
+          <p:cNvPr id="3" name="Content Placeholder 2"/>
+          <p:cNvPicPr>
+            <a:picLocks noGrp="1" noChangeAspect="1"/>
+          </p:cNvPicPr>
           <p:nvPr>
             <p:ph idx="1"/>
           </p:nvPr>
-        </p:nvSpPr>
+        </p:nvPicPr>
+        <p:blipFill>
+          <a:blip r:embed="rId3">
+            <a:extLst>
+              <a:ext uri="{28A0092B-C50C-407E-A947-70E740481C1C}">
+                <a14:useLocalDpi xmlns:a14="http://schemas.microsoft.com/office/drawing/2010/main" val="0"/>
+              </a:ext>
+            </a:extLst>
+          </a:blip>
+          <a:stretch>
+            <a:fillRect/>
+          </a:stretch>
+        </p:blipFill>
         <p:spPr>
           <a:xfrm>
-            <a:off x="474562" y="1481558"/>
-            <a:ext cx="8507392" cy="4282747"/>
+            <a:off x="917576" y="1481231"/>
+            <a:ext cx="7333251" cy="4283075"/>
           </a:xfrm>
         </p:spPr>
-        <p:txBody>
-          <a:bodyPr/>
-          <a:lstStyle/>
-          <a:p>
-            <a:endParaRPr lang="nl-NL" dirty="0"/>
-          </a:p>
-        </p:txBody>
-      </p:sp>
+      </p:pic>
     </p:spTree>
     <p:extLst>
       <p:ext uri="{BB962C8B-B14F-4D97-AF65-F5344CB8AC3E}">

</xml_diff>

<commit_message>
Endpresentation: game, technology and testing added
</commit_message>
<xml_diff>
--- a/documents/Eindpresentatie/webrtc.pptx
+++ b/documents/Eindpresentatie/webrtc.pptx
@@ -5,10 +5,10 @@
     <p:sldMasterId id="2147483649" r:id="rId1"/>
   </p:sldMasterIdLst>
   <p:notesMasterIdLst>
-    <p:notesMasterId r:id="rId16"/>
+    <p:notesMasterId r:id="rId18"/>
   </p:notesMasterIdLst>
   <p:handoutMasterIdLst>
-    <p:handoutMasterId r:id="rId17"/>
+    <p:handoutMasterId r:id="rId19"/>
   </p:handoutMasterIdLst>
   <p:sldIdLst>
     <p:sldId id="377" r:id="rId2"/>
@@ -20,11 +20,13 @@
     <p:sldId id="384" r:id="rId8"/>
     <p:sldId id="385" r:id="rId9"/>
     <p:sldId id="386" r:id="rId10"/>
-    <p:sldId id="387" r:id="rId11"/>
-    <p:sldId id="388" r:id="rId12"/>
-    <p:sldId id="389" r:id="rId13"/>
-    <p:sldId id="391" r:id="rId14"/>
-    <p:sldId id="390" r:id="rId15"/>
+    <p:sldId id="393" r:id="rId11"/>
+    <p:sldId id="387" r:id="rId12"/>
+    <p:sldId id="388" r:id="rId13"/>
+    <p:sldId id="392" r:id="rId14"/>
+    <p:sldId id="389" r:id="rId15"/>
+    <p:sldId id="391" r:id="rId16"/>
+    <p:sldId id="390" r:id="rId17"/>
   </p:sldIdLst>
   <p:sldSz cx="9144000" cy="6858000" type="screen4x3"/>
   <p:notesSz cx="6794500" cy="9931400"/>
@@ -155,7 +157,7 @@
   </p:defaultTextStyle>
   <p:extLst>
     <p:ext uri="{EFAFB233-063F-42B5-8137-9DF3F51BA10A}">
-      <p15:sldGuideLst xmlns:p15="http://schemas.microsoft.com/office/powerpoint/2012/main">
+      <p15:sldGuideLst xmlns:p15="http://schemas.microsoft.com/office/powerpoint/2012/main" xmlns="">
         <p15:guide id="1" orient="horz" pos="1296" userDrawn="1">
           <p15:clr>
             <a:srgbClr val="A4A3A4"/>
@@ -174,7 +176,7 @@
       </p15:sldGuideLst>
     </p:ext>
     <p:ext uri="{2D200454-40CA-4A62-9FC3-DE9A4176ACB9}">
-      <p15:notesGuideLst xmlns:p15="http://schemas.microsoft.com/office/powerpoint/2012/main"/>
+      <p15:notesGuideLst xmlns:p15="http://schemas.microsoft.com/office/powerpoint/2012/main" xmlns=""/>
     </p:ext>
   </p:extLst>
 </p:presentation>
@@ -299,7 +301,7 @@
             <a:fld id="{97C96585-7ED6-4727-9F98-2D855048CF87}" type="datetime1">
               <a:rPr lang="en-US"/>
               <a:pPr/>
-              <a:t>8/29/2013</a:t>
+              <a:t>8/30/2013</a:t>
             </a:fld>
             <a:endParaRPr lang="en-US"/>
           </a:p>
@@ -399,7 +401,7 @@
             <a:fld id="{D2735775-4C15-41EF-A6D4-DA0554EF6EE1}" type="slidenum">
               <a:rPr lang="en-US"/>
               <a:pPr/>
-              <a:t>‹#›</a:t>
+              <a:t>‹nr.›</a:t>
             </a:fld>
             <a:endParaRPr lang="en-US"/>
           </a:p>
@@ -740,7 +742,7 @@
             <a:fld id="{DDECF328-74EB-4684-8EC0-128B8857C3CD}" type="slidenum">
               <a:rPr lang="en-US"/>
               <a:pPr/>
-              <a:t>‹#›</a:t>
+              <a:t>‹nr.›</a:t>
             </a:fld>
             <a:endParaRPr lang="en-US"/>
           </a:p>
@@ -1039,7 +1041,7 @@
     </p:spTree>
     <p:extLst>
       <p:ext uri="{BB962C8B-B14F-4D97-AF65-F5344CB8AC3E}">
-        <p14:creationId xmlns:p14="http://schemas.microsoft.com/office/powerpoint/2010/main" val="4227780479"/>
+        <p14:creationId xmlns:p14="http://schemas.microsoft.com/office/powerpoint/2010/main" val="3008250824"/>
       </p:ext>
     </p:extLst>
   </p:cSld>
@@ -1124,7 +1126,7 @@
     </p:spTree>
     <p:extLst>
       <p:ext uri="{BB962C8B-B14F-4D97-AF65-F5344CB8AC3E}">
-        <p14:creationId xmlns:p14="http://schemas.microsoft.com/office/powerpoint/2010/main" val="3714345396"/>
+        <p14:creationId xmlns:p14="http://schemas.microsoft.com/office/powerpoint/2010/main" val="4227780479"/>
       </p:ext>
     </p:extLst>
   </p:cSld>
@@ -1178,176 +1180,7 @@
           <a:bodyPr/>
           <a:lstStyle/>
           <a:p>
-            <a:r>
-              <a:rPr lang="nl-NL" dirty="0" smtClean="0"/>
-              <a:t>In het begin van ons project hebben wij een onderzoeksvraag en</a:t>
-            </a:r>
-            <a:r>
-              <a:rPr lang="nl-NL" baseline="0" dirty="0" smtClean="0"/>
-              <a:t> een paar sub-vragen gedefinieerd. Deze vragen hebben wij onderzocht en onze resultaten geïmplementeerd in onze library gedeelte.</a:t>
-            </a:r>
-          </a:p>
-          <a:p>
-            <a:endParaRPr lang="nl-NL" baseline="0" dirty="0" smtClean="0"/>
-          </a:p>
-          <a:p>
-            <a:pPr marL="228600" indent="-228600">
-              <a:buAutoNum type="arabicPeriod"/>
-            </a:pPr>
-            <a:r>
-              <a:rPr lang="nl-NL" baseline="0" dirty="0" smtClean="0"/>
-              <a:t>Niet alleen maar bandbreedte speelt een rol -&gt; </a:t>
-            </a:r>
-            <a:r>
-              <a:rPr lang="nl-NL" b="1" baseline="0" dirty="0" err="1" smtClean="0"/>
-              <a:t>vivaldi</a:t>
-            </a:r>
-            <a:r>
-              <a:rPr lang="nl-NL" baseline="0" dirty="0" smtClean="0"/>
-              <a:t> -&gt; kortere theoretische afstand</a:t>
-            </a:r>
-            <a:br>
-              <a:rPr lang="nl-NL" baseline="0" dirty="0" smtClean="0"/>
-            </a:br>
-            <a:r>
-              <a:rPr lang="nl-NL" baseline="0" dirty="0" smtClean="0"/>
-              <a:t>Veel gedaan op het gebied van het versturen van berichten tussen </a:t>
-            </a:r>
-            <a:r>
-              <a:rPr lang="nl-NL" baseline="0" dirty="0" err="1" smtClean="0"/>
-              <a:t>nodes</a:t>
-            </a:r>
-            <a:r>
-              <a:rPr lang="nl-NL" baseline="0" dirty="0" smtClean="0"/>
-              <a:t>. Update berichten worden       gesplit omdat WebRTC het anders niet aan kan. -&gt; </a:t>
-            </a:r>
-            <a:r>
-              <a:rPr lang="nl-NL" b="1" baseline="0" dirty="0" err="1" smtClean="0"/>
-              <a:t>messages</a:t>
-            </a:r>
-            <a:r>
-              <a:rPr lang="nl-NL" b="1" baseline="0" dirty="0" smtClean="0"/>
-              <a:t/>
-            </a:r>
-            <a:br>
-              <a:rPr lang="nl-NL" b="1" baseline="0" dirty="0" smtClean="0"/>
-            </a:br>
-            <a:r>
-              <a:rPr lang="nl-NL" b="0" baseline="0" dirty="0" smtClean="0"/>
-              <a:t>Ook hebben we veel gedaan aan </a:t>
-            </a:r>
-            <a:r>
-              <a:rPr lang="nl-NL" b="1" baseline="0" dirty="0" smtClean="0"/>
-              <a:t>routing</a:t>
-            </a:r>
-            <a:r>
-              <a:rPr lang="nl-NL" b="0" baseline="0" dirty="0" smtClean="0"/>
-              <a:t> zodat de berichten de kortste weg naar de ontvanger pakken. </a:t>
-            </a:r>
-          </a:p>
-          <a:p>
-            <a:pPr marL="228600" indent="-228600">
-              <a:buAutoNum type="arabicPeriod"/>
-            </a:pPr>
-            <a:endParaRPr lang="nl-NL" b="0" baseline="0" dirty="0" smtClean="0"/>
-          </a:p>
-          <a:p>
-            <a:pPr marL="228600" indent="-228600">
-              <a:buAutoNum type="arabicPeriod"/>
-            </a:pPr>
-            <a:r>
-              <a:rPr lang="nl-NL" b="0" baseline="0" dirty="0" smtClean="0"/>
-              <a:t>PoPCorn helpt ons met het aanwijzen van </a:t>
-            </a:r>
-            <a:r>
-              <a:rPr lang="nl-NL" b="0" baseline="0" dirty="0" err="1" smtClean="0"/>
-              <a:t>supernodes</a:t>
-            </a:r>
-            <a:r>
-              <a:rPr lang="nl-NL" b="0" baseline="0" dirty="0" smtClean="0"/>
-              <a:t>. Die zorgen voor de connectiviteit van </a:t>
-            </a:r>
-            <a:r>
-              <a:rPr lang="nl-NL" b="0" baseline="0" dirty="0" err="1" smtClean="0"/>
-              <a:t>nodes</a:t>
-            </a:r>
-            <a:r>
-              <a:rPr lang="nl-NL" b="0" baseline="0" dirty="0" smtClean="0"/>
-              <a:t> en zorgen dat alle berichten aan kunnen komen door te verbinden met andere </a:t>
-            </a:r>
-            <a:r>
-              <a:rPr lang="nl-NL" b="0" baseline="0" dirty="0" err="1" smtClean="0"/>
-              <a:t>supernodes</a:t>
-            </a:r>
-            <a:r>
-              <a:rPr lang="nl-NL" b="0" baseline="0" dirty="0" smtClean="0"/>
-              <a:t>. Het mooie van PoPCorn is dat </a:t>
-            </a:r>
-            <a:r>
-              <a:rPr lang="nl-NL" b="0" baseline="0" dirty="0" err="1" smtClean="0"/>
-              <a:t>supernodes</a:t>
-            </a:r>
-            <a:r>
-              <a:rPr lang="nl-NL" b="0" baseline="0" dirty="0" smtClean="0"/>
-              <a:t> worden aangemaakt en verdwijnen wanneer ze nodig zijn.</a:t>
-            </a:r>
-          </a:p>
-          <a:p>
-            <a:pPr marL="228600" indent="-228600">
-              <a:buAutoNum type="arabicPeriod"/>
-            </a:pPr>
-            <a:endParaRPr lang="nl-NL" b="0" baseline="0" dirty="0" smtClean="0"/>
-          </a:p>
-          <a:p>
-            <a:pPr marL="228600" indent="-228600">
-              <a:buAutoNum type="arabicPeriod"/>
-            </a:pPr>
-            <a:r>
-              <a:rPr lang="nl-NL" b="0" baseline="0" dirty="0" smtClean="0"/>
-              <a:t>Omdat WebRTC kanalen in </a:t>
-            </a:r>
-            <a:r>
-              <a:rPr lang="nl-NL" b="0" baseline="0" dirty="0" err="1" smtClean="0"/>
-              <a:t>Chrome</a:t>
-            </a:r>
-            <a:r>
-              <a:rPr lang="nl-NL" b="0" baseline="0" dirty="0" smtClean="0"/>
-              <a:t> nog </a:t>
-            </a:r>
-            <a:r>
-              <a:rPr lang="nl-NL" b="0" baseline="0" dirty="0" err="1" smtClean="0"/>
-              <a:t>unreliable</a:t>
-            </a:r>
-            <a:r>
-              <a:rPr lang="nl-NL" b="0" baseline="0" dirty="0" smtClean="0"/>
-              <a:t> zijn, is foutcorrectie heel belangrijk</a:t>
-            </a:r>
-            <a:r>
-              <a:rPr lang="nl-NL" b="1" baseline="0" dirty="0" smtClean="0"/>
-              <a:t/>
-            </a:r>
-            <a:br>
-              <a:rPr lang="nl-NL" b="1" baseline="0" dirty="0" smtClean="0"/>
-            </a:br>
-            <a:r>
-              <a:rPr lang="nl-NL" b="1" baseline="0" dirty="0" smtClean="0"/>
-              <a:t>Voorkomen – </a:t>
-            </a:r>
-            <a:r>
-              <a:rPr lang="nl-NL" b="0" baseline="0" dirty="0" smtClean="0"/>
-              <a:t>server gebruik. Status naar server, list van server en verbinden met wie nodig</a:t>
-            </a:r>
-            <a:br>
-              <a:rPr lang="nl-NL" b="0" baseline="0" dirty="0" smtClean="0"/>
-            </a:br>
-            <a:r>
-              <a:rPr lang="nl-NL" b="1" baseline="0" dirty="0" smtClean="0"/>
-              <a:t>Genezen – </a:t>
-            </a:r>
-            <a:r>
-              <a:rPr lang="nl-NL" b="0" baseline="0" dirty="0" smtClean="0"/>
-              <a:t>kapotte relaties, kapotte tokens</a:t>
-            </a:r>
+            <a:endParaRPr lang="nl-NL"/>
           </a:p>
         </p:txBody>
       </p:sp>
@@ -1378,7 +1211,7 @@
     </p:spTree>
     <p:extLst>
       <p:ext uri="{BB962C8B-B14F-4D97-AF65-F5344CB8AC3E}">
-        <p14:creationId xmlns:p14="http://schemas.microsoft.com/office/powerpoint/2010/main" val="4293460136"/>
+        <p14:creationId xmlns:p14="http://schemas.microsoft.com/office/powerpoint/2010/main" val="3714345396"/>
       </p:ext>
     </p:extLst>
   </p:cSld>
@@ -1432,83 +1265,7 @@
           <a:bodyPr/>
           <a:lstStyle/>
           <a:p>
-            <a:r>
-              <a:rPr lang="nl-NL" dirty="0" smtClean="0"/>
-              <a:t>Al</a:t>
-            </a:r>
-            <a:r>
-              <a:rPr lang="nl-NL" baseline="0" dirty="0" smtClean="0"/>
-              <a:t> </a:t>
-            </a:r>
-            <a:r>
-              <a:rPr lang="nl-NL" dirty="0" smtClean="0"/>
-              <a:t>voordat</a:t>
-            </a:r>
-            <a:r>
-              <a:rPr lang="nl-NL" baseline="0" dirty="0" smtClean="0"/>
-              <a:t> wij begonnen bij TNO waren we </a:t>
-            </a:r>
-            <a:r>
-              <a:rPr lang="nl-NL" baseline="0" dirty="0" smtClean="0"/>
-              <a:t>al de recente ontwikkelingen op het gebied van WebRTC aan het volgen. Waar 3 maanden geleden voornamelijk demo’s waren van “kijk, we kunnen bellen in de browser”, is er op dit moment al een overvloed aan </a:t>
-            </a:r>
-            <a:r>
-              <a:rPr lang="nl-NL" baseline="0" dirty="0" err="1" smtClean="0"/>
-              <a:t>tutorials</a:t>
-            </a:r>
-            <a:r>
-              <a:rPr lang="nl-NL" baseline="0" dirty="0" smtClean="0"/>
-              <a:t>, demo’s, </a:t>
-            </a:r>
-            <a:r>
-              <a:rPr lang="nl-NL" baseline="0" dirty="0" err="1" smtClean="0"/>
-              <a:t>libraries</a:t>
-            </a:r>
-            <a:r>
-              <a:rPr lang="nl-NL" baseline="0" dirty="0" smtClean="0"/>
-              <a:t> en verschillende types van applicaties. CDN…</a:t>
-            </a:r>
-          </a:p>
-          <a:p>
-            <a:endParaRPr lang="nl-NL" baseline="0" dirty="0" smtClean="0"/>
-          </a:p>
-          <a:p>
-            <a:r>
-              <a:rPr lang="nl-NL" baseline="0" dirty="0" smtClean="0"/>
-              <a:t>Libraries maken de technologie zelf meer toegankelijk voor de beginnende programmeur waardoor de interesse voor WebRTC aan alle fronten groeit.</a:t>
-            </a:r>
-          </a:p>
-          <a:p>
-            <a:endParaRPr lang="nl-NL" baseline="0" dirty="0" smtClean="0"/>
-          </a:p>
-          <a:p>
-            <a:r>
-              <a:rPr lang="nl-NL" baseline="0" dirty="0" smtClean="0"/>
-              <a:t>Het gebruik van </a:t>
-            </a:r>
-            <a:r>
-              <a:rPr lang="nl-NL" baseline="0" dirty="0" err="1" smtClean="0"/>
-              <a:t>webrtc</a:t>
-            </a:r>
-            <a:r>
-              <a:rPr lang="nl-NL" baseline="0" dirty="0" smtClean="0"/>
-              <a:t> gaat samen met javascript en html 5. javascript web applicaties gebouwd met html5 zijn op dit moment enorm aan het groeien, mede door het opkomst van javascript gebaseerde browsers.</a:t>
-            </a:r>
-          </a:p>
-          <a:p>
-            <a:endParaRPr lang="nl-NL" baseline="0" dirty="0" smtClean="0"/>
-          </a:p>
-          <a:p>
-            <a:r>
-              <a:rPr lang="nl-NL" baseline="0" dirty="0" smtClean="0"/>
-              <a:t>Web applicaties nemen een steeds grotere rol in ons digitale leven. Wij verwachten dat op korte termijn de meeste hiervoor genoemde p2p applicaties ook zullen verhuizen naar de browser.</a:t>
-            </a:r>
-          </a:p>
-          <a:p>
-            <a:r>
-              <a:rPr lang="nl-NL" baseline="0" dirty="0" smtClean="0"/>
-              <a:t>Maar helaas nog niet alle browsers.</a:t>
-            </a:r>
+            <a:endParaRPr lang="nl-NL" dirty="0"/>
           </a:p>
         </p:txBody>
       </p:sp>
@@ -1539,7 +1296,7 @@
     </p:spTree>
     <p:extLst>
       <p:ext uri="{BB962C8B-B14F-4D97-AF65-F5344CB8AC3E}">
-        <p14:creationId xmlns:p14="http://schemas.microsoft.com/office/powerpoint/2010/main" val="3459283393"/>
+        <p14:creationId xmlns:p14="http://schemas.microsoft.com/office/powerpoint/2010/main" val="3714345396"/>
       </p:ext>
     </p:extLst>
   </p:cSld>
@@ -1593,7 +1350,176 @@
           <a:bodyPr/>
           <a:lstStyle/>
           <a:p>
-            <a:endParaRPr lang="nl-NL"/>
+            <a:r>
+              <a:rPr lang="nl-NL" dirty="0" smtClean="0"/>
+              <a:t>In het begin van ons project hebben wij een onderzoeksvraag en</a:t>
+            </a:r>
+            <a:r>
+              <a:rPr lang="nl-NL" baseline="0" dirty="0" smtClean="0"/>
+              <a:t> een paar sub-vragen gedefinieerd. Deze vragen hebben wij onderzocht en onze resultaten geïmplementeerd in onze library gedeelte.</a:t>
+            </a:r>
+          </a:p>
+          <a:p>
+            <a:endParaRPr lang="nl-NL" baseline="0" dirty="0" smtClean="0"/>
+          </a:p>
+          <a:p>
+            <a:pPr marL="228600" indent="-228600">
+              <a:buAutoNum type="arabicPeriod"/>
+            </a:pPr>
+            <a:r>
+              <a:rPr lang="nl-NL" baseline="0" dirty="0" smtClean="0"/>
+              <a:t>Niet alleen maar bandbreedte speelt een rol -&gt; </a:t>
+            </a:r>
+            <a:r>
+              <a:rPr lang="nl-NL" b="1" baseline="0" dirty="0" err="1" smtClean="0"/>
+              <a:t>vivaldi</a:t>
+            </a:r>
+            <a:r>
+              <a:rPr lang="nl-NL" baseline="0" dirty="0" smtClean="0"/>
+              <a:t> -&gt; kortere theoretische afstand</a:t>
+            </a:r>
+            <a:br>
+              <a:rPr lang="nl-NL" baseline="0" dirty="0" smtClean="0"/>
+            </a:br>
+            <a:r>
+              <a:rPr lang="nl-NL" baseline="0" dirty="0" smtClean="0"/>
+              <a:t>Veel gedaan op het gebied van het versturen van berichten tussen </a:t>
+            </a:r>
+            <a:r>
+              <a:rPr lang="nl-NL" baseline="0" dirty="0" err="1" smtClean="0"/>
+              <a:t>nodes</a:t>
+            </a:r>
+            <a:r>
+              <a:rPr lang="nl-NL" baseline="0" dirty="0" smtClean="0"/>
+              <a:t>. Update berichten worden       gesplit omdat WebRTC het anders niet aan kan. -&gt; </a:t>
+            </a:r>
+            <a:r>
+              <a:rPr lang="nl-NL" b="1" baseline="0" dirty="0" err="1" smtClean="0"/>
+              <a:t>messages</a:t>
+            </a:r>
+            <a:r>
+              <a:rPr lang="nl-NL" b="1" baseline="0" dirty="0" smtClean="0"/>
+              <a:t/>
+            </a:r>
+            <a:br>
+              <a:rPr lang="nl-NL" b="1" baseline="0" dirty="0" smtClean="0"/>
+            </a:br>
+            <a:r>
+              <a:rPr lang="nl-NL" b="0" baseline="0" dirty="0" smtClean="0"/>
+              <a:t>Ook hebben we veel gedaan aan </a:t>
+            </a:r>
+            <a:r>
+              <a:rPr lang="nl-NL" b="1" baseline="0" dirty="0" smtClean="0"/>
+              <a:t>routing</a:t>
+            </a:r>
+            <a:r>
+              <a:rPr lang="nl-NL" b="0" baseline="0" dirty="0" smtClean="0"/>
+              <a:t> zodat de berichten de kortste weg naar de ontvanger pakken. </a:t>
+            </a:r>
+          </a:p>
+          <a:p>
+            <a:pPr marL="228600" indent="-228600">
+              <a:buAutoNum type="arabicPeriod"/>
+            </a:pPr>
+            <a:endParaRPr lang="nl-NL" b="0" baseline="0" dirty="0" smtClean="0"/>
+          </a:p>
+          <a:p>
+            <a:pPr marL="228600" indent="-228600">
+              <a:buAutoNum type="arabicPeriod"/>
+            </a:pPr>
+            <a:r>
+              <a:rPr lang="nl-NL" b="0" baseline="0" dirty="0" smtClean="0"/>
+              <a:t>PoPCorn helpt ons met het aanwijzen van </a:t>
+            </a:r>
+            <a:r>
+              <a:rPr lang="nl-NL" b="0" baseline="0" dirty="0" err="1" smtClean="0"/>
+              <a:t>supernodes</a:t>
+            </a:r>
+            <a:r>
+              <a:rPr lang="nl-NL" b="0" baseline="0" dirty="0" smtClean="0"/>
+              <a:t>. Die zorgen voor de connectiviteit van </a:t>
+            </a:r>
+            <a:r>
+              <a:rPr lang="nl-NL" b="0" baseline="0" dirty="0" err="1" smtClean="0"/>
+              <a:t>nodes</a:t>
+            </a:r>
+            <a:r>
+              <a:rPr lang="nl-NL" b="0" baseline="0" dirty="0" smtClean="0"/>
+              <a:t> en zorgen dat alle berichten aan kunnen komen door te verbinden met andere </a:t>
+            </a:r>
+            <a:r>
+              <a:rPr lang="nl-NL" b="0" baseline="0" dirty="0" err="1" smtClean="0"/>
+              <a:t>supernodes</a:t>
+            </a:r>
+            <a:r>
+              <a:rPr lang="nl-NL" b="0" baseline="0" dirty="0" smtClean="0"/>
+              <a:t>. Het mooie van PoPCorn is dat </a:t>
+            </a:r>
+            <a:r>
+              <a:rPr lang="nl-NL" b="0" baseline="0" dirty="0" err="1" smtClean="0"/>
+              <a:t>supernodes</a:t>
+            </a:r>
+            <a:r>
+              <a:rPr lang="nl-NL" b="0" baseline="0" dirty="0" smtClean="0"/>
+              <a:t> worden aangemaakt en verdwijnen wanneer ze nodig zijn.</a:t>
+            </a:r>
+          </a:p>
+          <a:p>
+            <a:pPr marL="228600" indent="-228600">
+              <a:buAutoNum type="arabicPeriod"/>
+            </a:pPr>
+            <a:endParaRPr lang="nl-NL" b="0" baseline="0" dirty="0" smtClean="0"/>
+          </a:p>
+          <a:p>
+            <a:pPr marL="228600" indent="-228600">
+              <a:buAutoNum type="arabicPeriod"/>
+            </a:pPr>
+            <a:r>
+              <a:rPr lang="nl-NL" b="0" baseline="0" dirty="0" smtClean="0"/>
+              <a:t>Omdat WebRTC kanalen in </a:t>
+            </a:r>
+            <a:r>
+              <a:rPr lang="nl-NL" b="0" baseline="0" dirty="0" err="1" smtClean="0"/>
+              <a:t>Chrome</a:t>
+            </a:r>
+            <a:r>
+              <a:rPr lang="nl-NL" b="0" baseline="0" dirty="0" smtClean="0"/>
+              <a:t> nog </a:t>
+            </a:r>
+            <a:r>
+              <a:rPr lang="nl-NL" b="0" baseline="0" dirty="0" err="1" smtClean="0"/>
+              <a:t>unreliable</a:t>
+            </a:r>
+            <a:r>
+              <a:rPr lang="nl-NL" b="0" baseline="0" dirty="0" smtClean="0"/>
+              <a:t> zijn, is foutcorrectie heel belangrijk</a:t>
+            </a:r>
+            <a:r>
+              <a:rPr lang="nl-NL" b="1" baseline="0" dirty="0" smtClean="0"/>
+              <a:t/>
+            </a:r>
+            <a:br>
+              <a:rPr lang="nl-NL" b="1" baseline="0" dirty="0" smtClean="0"/>
+            </a:br>
+            <a:r>
+              <a:rPr lang="nl-NL" b="1" baseline="0" dirty="0" smtClean="0"/>
+              <a:t>Voorkomen – </a:t>
+            </a:r>
+            <a:r>
+              <a:rPr lang="nl-NL" b="0" baseline="0" dirty="0" smtClean="0"/>
+              <a:t>server gebruik. Status naar server, list van server en verbinden met wie nodig</a:t>
+            </a:r>
+            <a:br>
+              <a:rPr lang="nl-NL" b="0" baseline="0" dirty="0" smtClean="0"/>
+            </a:br>
+            <a:r>
+              <a:rPr lang="nl-NL" b="1" baseline="0" dirty="0" smtClean="0"/>
+              <a:t>Genezen – </a:t>
+            </a:r>
+            <a:r>
+              <a:rPr lang="nl-NL" b="0" baseline="0" dirty="0" smtClean="0"/>
+              <a:t>kapotte relaties, kapotte tokens</a:t>
+            </a:r>
           </a:p>
         </p:txBody>
       </p:sp>
@@ -1616,6 +1542,248 @@
               <a:rPr lang="en-US" smtClean="0"/>
               <a:pPr/>
               <a:t>14</a:t>
+            </a:fld>
+            <a:endParaRPr lang="en-US"/>
+          </a:p>
+        </p:txBody>
+      </p:sp>
+    </p:spTree>
+    <p:extLst>
+      <p:ext uri="{BB962C8B-B14F-4D97-AF65-F5344CB8AC3E}">
+        <p14:creationId xmlns:p14="http://schemas.microsoft.com/office/powerpoint/2010/main" val="4293460136"/>
+      </p:ext>
+    </p:extLst>
+  </p:cSld>
+  <p:clrMapOvr>
+    <a:masterClrMapping/>
+  </p:clrMapOvr>
+</p:notes>
+</file>
+
+<file path=ppt/notesSlides/notesSlide15.xml><?xml version="1.0" encoding="utf-8"?>
+<p:notes xmlns:a="http://schemas.openxmlformats.org/drawingml/2006/main" xmlns:r="http://schemas.openxmlformats.org/officeDocument/2006/relationships" xmlns:p="http://schemas.openxmlformats.org/presentationml/2006/main">
+  <p:cSld>
+    <p:spTree>
+      <p:nvGrpSpPr>
+        <p:cNvPr id="1" name=""/>
+        <p:cNvGrpSpPr/>
+        <p:nvPr/>
+      </p:nvGrpSpPr>
+      <p:grpSpPr>
+        <a:xfrm>
+          <a:off x="0" y="0"/>
+          <a:ext cx="0" cy="0"/>
+          <a:chOff x="0" y="0"/>
+          <a:chExt cx="0" cy="0"/>
+        </a:xfrm>
+      </p:grpSpPr>
+      <p:sp>
+        <p:nvSpPr>
+          <p:cNvPr id="2" name="Slide Image Placeholder 1"/>
+          <p:cNvSpPr>
+            <a:spLocks noGrp="1" noRot="1" noChangeAspect="1"/>
+          </p:cNvSpPr>
+          <p:nvPr>
+            <p:ph type="sldImg"/>
+          </p:nvPr>
+        </p:nvSpPr>
+        <p:spPr/>
+      </p:sp>
+      <p:sp>
+        <p:nvSpPr>
+          <p:cNvPr id="3" name="Notes Placeholder 2"/>
+          <p:cNvSpPr>
+            <a:spLocks noGrp="1"/>
+          </p:cNvSpPr>
+          <p:nvPr>
+            <p:ph type="body" idx="1"/>
+          </p:nvPr>
+        </p:nvSpPr>
+        <p:spPr/>
+        <p:txBody>
+          <a:bodyPr/>
+          <a:lstStyle/>
+          <a:p>
+            <a:r>
+              <a:rPr lang="nl-NL" dirty="0" smtClean="0"/>
+              <a:t>Al</a:t>
+            </a:r>
+            <a:r>
+              <a:rPr lang="nl-NL" baseline="0" dirty="0" smtClean="0"/>
+              <a:t> </a:t>
+            </a:r>
+            <a:r>
+              <a:rPr lang="nl-NL" dirty="0" smtClean="0"/>
+              <a:t>voordat</a:t>
+            </a:r>
+            <a:r>
+              <a:rPr lang="nl-NL" baseline="0" dirty="0" smtClean="0"/>
+              <a:t> wij begonnen bij TNO waren we al de recente ontwikkelingen op het gebied van WebRTC aan het volgen. Waar 3 maanden geleden voornamelijk demo’s waren van “kijk, we kunnen bellen in de browser”, is er op dit moment al een overvloed aan </a:t>
+            </a:r>
+            <a:r>
+              <a:rPr lang="nl-NL" baseline="0" dirty="0" err="1" smtClean="0"/>
+              <a:t>tutorials</a:t>
+            </a:r>
+            <a:r>
+              <a:rPr lang="nl-NL" baseline="0" dirty="0" smtClean="0"/>
+              <a:t>, demo’s, </a:t>
+            </a:r>
+            <a:r>
+              <a:rPr lang="nl-NL" baseline="0" dirty="0" err="1" smtClean="0"/>
+              <a:t>libraries</a:t>
+            </a:r>
+            <a:r>
+              <a:rPr lang="nl-NL" baseline="0" dirty="0" smtClean="0"/>
+              <a:t> en verschillende types van applicaties. CDN…</a:t>
+            </a:r>
+          </a:p>
+          <a:p>
+            <a:endParaRPr lang="nl-NL" baseline="0" dirty="0" smtClean="0"/>
+          </a:p>
+          <a:p>
+            <a:r>
+              <a:rPr lang="nl-NL" baseline="0" dirty="0" smtClean="0"/>
+              <a:t>Libraries maken de technologie zelf meer toegankelijk voor de beginnende programmeur waardoor de interesse voor WebRTC aan alle fronten groeit.</a:t>
+            </a:r>
+          </a:p>
+          <a:p>
+            <a:endParaRPr lang="nl-NL" baseline="0" dirty="0" smtClean="0"/>
+          </a:p>
+          <a:p>
+            <a:r>
+              <a:rPr lang="nl-NL" baseline="0" dirty="0" smtClean="0"/>
+              <a:t>Het gebruik van </a:t>
+            </a:r>
+            <a:r>
+              <a:rPr lang="nl-NL" baseline="0" dirty="0" err="1" smtClean="0"/>
+              <a:t>webrtc</a:t>
+            </a:r>
+            <a:r>
+              <a:rPr lang="nl-NL" baseline="0" dirty="0" smtClean="0"/>
+              <a:t> gaat samen met javascript en html 5. javascript web applicaties gebouwd met html5 zijn op dit moment enorm aan het groeien, mede door het opkomst van javascript gebaseerde browsers.</a:t>
+            </a:r>
+          </a:p>
+          <a:p>
+            <a:endParaRPr lang="nl-NL" baseline="0" dirty="0" smtClean="0"/>
+          </a:p>
+          <a:p>
+            <a:r>
+              <a:rPr lang="nl-NL" baseline="0" dirty="0" smtClean="0"/>
+              <a:t>Web applicaties nemen een steeds grotere rol in ons digitale leven. Wij verwachten dat op korte termijn de meeste hiervoor genoemde p2p applicaties ook zullen verhuizen naar de browser.</a:t>
+            </a:r>
+          </a:p>
+          <a:p>
+            <a:r>
+              <a:rPr lang="nl-NL" baseline="0" dirty="0" smtClean="0"/>
+              <a:t>Maar helaas nog niet alle browsers.</a:t>
+            </a:r>
+          </a:p>
+        </p:txBody>
+      </p:sp>
+      <p:sp>
+        <p:nvSpPr>
+          <p:cNvPr id="4" name="Slide Number Placeholder 3"/>
+          <p:cNvSpPr>
+            <a:spLocks noGrp="1"/>
+          </p:cNvSpPr>
+          <p:nvPr>
+            <p:ph type="sldNum" sz="quarter" idx="10"/>
+          </p:nvPr>
+        </p:nvSpPr>
+        <p:spPr/>
+        <p:txBody>
+          <a:bodyPr/>
+          <a:lstStyle/>
+          <a:p>
+            <a:fld id="{DDECF328-74EB-4684-8EC0-128B8857C3CD}" type="slidenum">
+              <a:rPr lang="en-US" smtClean="0"/>
+              <a:pPr/>
+              <a:t>15</a:t>
+            </a:fld>
+            <a:endParaRPr lang="en-US"/>
+          </a:p>
+        </p:txBody>
+      </p:sp>
+    </p:spTree>
+    <p:extLst>
+      <p:ext uri="{BB962C8B-B14F-4D97-AF65-F5344CB8AC3E}">
+        <p14:creationId xmlns:p14="http://schemas.microsoft.com/office/powerpoint/2010/main" val="3459283393"/>
+      </p:ext>
+    </p:extLst>
+  </p:cSld>
+  <p:clrMapOvr>
+    <a:masterClrMapping/>
+  </p:clrMapOvr>
+</p:notes>
+</file>
+
+<file path=ppt/notesSlides/notesSlide16.xml><?xml version="1.0" encoding="utf-8"?>
+<p:notes xmlns:a="http://schemas.openxmlformats.org/drawingml/2006/main" xmlns:r="http://schemas.openxmlformats.org/officeDocument/2006/relationships" xmlns:p="http://schemas.openxmlformats.org/presentationml/2006/main">
+  <p:cSld>
+    <p:spTree>
+      <p:nvGrpSpPr>
+        <p:cNvPr id="1" name=""/>
+        <p:cNvGrpSpPr/>
+        <p:nvPr/>
+      </p:nvGrpSpPr>
+      <p:grpSpPr>
+        <a:xfrm>
+          <a:off x="0" y="0"/>
+          <a:ext cx="0" cy="0"/>
+          <a:chOff x="0" y="0"/>
+          <a:chExt cx="0" cy="0"/>
+        </a:xfrm>
+      </p:grpSpPr>
+      <p:sp>
+        <p:nvSpPr>
+          <p:cNvPr id="2" name="Slide Image Placeholder 1"/>
+          <p:cNvSpPr>
+            <a:spLocks noGrp="1" noRot="1" noChangeAspect="1"/>
+          </p:cNvSpPr>
+          <p:nvPr>
+            <p:ph type="sldImg"/>
+          </p:nvPr>
+        </p:nvSpPr>
+        <p:spPr/>
+      </p:sp>
+      <p:sp>
+        <p:nvSpPr>
+          <p:cNvPr id="3" name="Notes Placeholder 2"/>
+          <p:cNvSpPr>
+            <a:spLocks noGrp="1"/>
+          </p:cNvSpPr>
+          <p:nvPr>
+            <p:ph type="body" idx="1"/>
+          </p:nvPr>
+        </p:nvSpPr>
+        <p:spPr/>
+        <p:txBody>
+          <a:bodyPr/>
+          <a:lstStyle/>
+          <a:p>
+            <a:endParaRPr lang="nl-NL"/>
+          </a:p>
+        </p:txBody>
+      </p:sp>
+      <p:sp>
+        <p:nvSpPr>
+          <p:cNvPr id="4" name="Slide Number Placeholder 3"/>
+          <p:cNvSpPr>
+            <a:spLocks noGrp="1"/>
+          </p:cNvSpPr>
+          <p:nvPr>
+            <p:ph type="sldNum" sz="quarter" idx="10"/>
+          </p:nvPr>
+        </p:nvSpPr>
+        <p:spPr/>
+        <p:txBody>
+          <a:bodyPr/>
+          <a:lstStyle/>
+          <a:p>
+            <a:fld id="{DDECF328-74EB-4684-8EC0-128B8857C3CD}" type="slidenum">
+              <a:rPr lang="en-US" smtClean="0"/>
+              <a:pPr/>
+              <a:t>16</a:t>
             </a:fld>
             <a:endParaRPr lang="en-US"/>
           </a:p>
@@ -5365,7 +5533,7 @@
                 <a:ea typeface="ＭＳ Ｐゴシック" panose="020B0600070205080204" pitchFamily="34" charset="-128"/>
               </a:rPr>
               <a:pPr algn="r" eaLnBrk="1" hangingPunct="1"/>
-              <a:t>‹#›</a:t>
+              <a:t>‹nr.›</a:t>
             </a:fld>
             <a:endParaRPr lang="nl-NL" sz="1100" dirty="0">
               <a:ea typeface="ＭＳ Ｐゴシック" panose="020B0600070205080204" pitchFamily="34" charset="-128"/>
@@ -6163,7 +6331,7 @@
                 <a:latin typeface="Bookman Old Style" panose="02050604050505020204" pitchFamily="18" charset="0"/>
                 <a:ea typeface="ＭＳ Ｐゴシック" panose="020B0600070205080204" pitchFamily="34" charset="-128"/>
               </a:rPr>
-              <a:t>29 August 2013</a:t>
+              <a:t>30 August 2013</a:t>
             </a:fld>
             <a:endParaRPr lang="en-US" dirty="0" smtClean="0">
               <a:latin typeface="Bookman Old Style" panose="02050604050505020204" pitchFamily="18" charset="0"/>
@@ -6357,13 +6525,17 @@
           <a:p>
             <a:r>
               <a:rPr lang="en-GB" dirty="0" smtClean="0"/>
-              <a:t>Technology</a:t>
+              <a:t>Game</a:t>
+            </a:r>
+            <a:r>
+              <a:rPr lang="en-GB" smtClean="0"/>
+              <a:t/>
             </a:r>
             <a:br>
-              <a:rPr lang="en-GB" dirty="0" smtClean="0"/>
+              <a:rPr lang="en-GB" smtClean="0"/>
             </a:br>
             <a:r>
-              <a:rPr lang="en-GB" sz="2400" dirty="0" smtClean="0">
+              <a:rPr lang="en-GB" sz="2400" smtClean="0">
                 <a:solidFill>
                   <a:schemeClr val="accent6">
                     <a:lumMod val="50000"/>
@@ -6371,7 +6543,7 @@
                   </a:schemeClr>
                 </a:solidFill>
               </a:rPr>
-              <a:t>subtitle</a:t>
+              <a:t>Demonstration</a:t>
             </a:r>
             <a:endParaRPr lang="en-GB" sz="2400" dirty="0">
               <a:solidFill>
@@ -6399,8 +6571,22 @@
           <a:bodyPr/>
           <a:lstStyle/>
           <a:p>
-            <a:pPr lvl="1"/>
-            <a:endParaRPr lang="en-GB" dirty="0"/>
+            <a:pPr marL="385763" lvl="1" indent="0">
+              <a:buNone/>
+            </a:pPr>
+            <a:r>
+              <a:rPr lang="en-US" dirty="0">
+                <a:hlinkClick r:id="rId3"/>
+              </a:rPr>
+              <a:t>https://www.youtube.com/watch?v=-</a:t>
+            </a:r>
+            <a:r>
+              <a:rPr lang="en-US" dirty="0" smtClean="0">
+                <a:hlinkClick r:id="rId3"/>
+              </a:rPr>
+              <a:t>QyrLRmg-2o</a:t>
+            </a:r>
+            <a:endParaRPr lang="en-GB" dirty="0" smtClean="0"/>
           </a:p>
         </p:txBody>
       </p:sp>
@@ -6501,18 +6687,8 @@
               <a:t> ● </a:t>
             </a:r>
             <a:r>
-              <a:rPr lang="en-GB" sz="1200" baseline="0" dirty="0" smtClean="0">
-                <a:solidFill>
-                  <a:schemeClr val="bg1">
-                    <a:lumMod val="65000"/>
-                  </a:schemeClr>
-                </a:solidFill>
-              </a:rPr>
-              <a:t>Game ● </a:t>
-            </a:r>
-            <a:r>
               <a:rPr lang="en-GB" sz="1400" b="1" baseline="0" dirty="0" smtClean="0"/>
-              <a:t>Technology</a:t>
+              <a:t>Game</a:t>
             </a:r>
             <a:r>
               <a:rPr lang="en-GB" sz="1200" baseline="0" dirty="0" smtClean="0"/>
@@ -6526,7 +6702,7 @@
                   </a:schemeClr>
                 </a:solidFill>
               </a:rPr>
-              <a:t>● Quality &amp; Testing ● Conclusion </a:t>
+              <a:t>● Technology ● Quality &amp; Testing ● Conclusion </a:t>
             </a:r>
             <a:r>
               <a:rPr lang="en-GB" sz="1200" dirty="0" smtClean="0">
@@ -6551,7 +6727,7 @@
     </p:spTree>
     <p:extLst>
       <p:ext uri="{BB962C8B-B14F-4D97-AF65-F5344CB8AC3E}">
-        <p14:creationId xmlns:p14="http://schemas.microsoft.com/office/powerpoint/2010/main" val="4069369230"/>
+        <p14:creationId xmlns:p14="http://schemas.microsoft.com/office/powerpoint/2010/main" val="2192585120"/>
       </p:ext>
     </p:extLst>
   </p:cSld>
@@ -6602,18 +6778,14 @@
           <a:p>
             <a:r>
               <a:rPr lang="en-GB" dirty="0" smtClean="0"/>
-              <a:t>Quality </a:t>
-            </a:r>
-            <a:r>
-              <a:rPr lang="en-GB" smtClean="0"/>
-              <a:t>and Testing</a:t>
-            </a:r>
-            <a:r>
-              <a:rPr lang="en-GB" dirty="0" smtClean="0"/>
+              <a:t>Technology</a:t>
+            </a:r>
+            <a:r>
+              <a:rPr lang="en-GB" sz="2400" dirty="0"/>
               <a:t/>
             </a:r>
             <a:br>
-              <a:rPr lang="en-GB" dirty="0" smtClean="0"/>
+              <a:rPr lang="en-GB" sz="2400" dirty="0"/>
             </a:br>
             <a:r>
               <a:rPr lang="en-GB" sz="2400" dirty="0" smtClean="0">
@@ -6624,7 +6796,7 @@
                   </a:schemeClr>
                 </a:solidFill>
               </a:rPr>
-              <a:t>subtitle</a:t>
+              <a:t>The tools to the goal</a:t>
             </a:r>
             <a:endParaRPr lang="en-GB" sz="2400" dirty="0">
               <a:solidFill>
@@ -6634,26 +6806,6 @@
                 </a:schemeClr>
               </a:solidFill>
             </a:endParaRPr>
-          </a:p>
-        </p:txBody>
-      </p:sp>
-      <p:sp>
-        <p:nvSpPr>
-          <p:cNvPr id="3" name="Content Placeholder 2"/>
-          <p:cNvSpPr>
-            <a:spLocks noGrp="1"/>
-          </p:cNvSpPr>
-          <p:nvPr>
-            <p:ph idx="1"/>
-          </p:nvPr>
-        </p:nvSpPr>
-        <p:spPr/>
-        <p:txBody>
-          <a:bodyPr/>
-          <a:lstStyle/>
-          <a:p>
-            <a:pPr lvl="1"/>
-            <a:endParaRPr lang="en-GB" dirty="0"/>
           </a:p>
         </p:txBody>
       </p:sp>
@@ -6761,11 +6913,15 @@
                   </a:schemeClr>
                 </a:solidFill>
               </a:rPr>
-              <a:t>Game ● Technology ● </a:t>
+              <a:t>Game ● </a:t>
             </a:r>
             <a:r>
               <a:rPr lang="en-GB" sz="1400" b="1" baseline="0" dirty="0" smtClean="0"/>
-              <a:t>Quality &amp; Testing</a:t>
+              <a:t>Technology</a:t>
+            </a:r>
+            <a:r>
+              <a:rPr lang="en-GB" sz="1200" baseline="0" dirty="0" smtClean="0"/>
+              <a:t> </a:t>
             </a:r>
             <a:r>
               <a:rPr lang="en-GB" sz="1200" baseline="0" dirty="0" smtClean="0">
@@ -6775,7 +6931,7 @@
                   </a:schemeClr>
                 </a:solidFill>
               </a:rPr>
-              <a:t> ● Conclusion </a:t>
+              <a:t>● Quality &amp; Testing ● Conclusion </a:t>
             </a:r>
             <a:r>
               <a:rPr lang="en-GB" sz="1200" dirty="0" smtClean="0">
@@ -6797,10 +6953,369 @@
           </a:p>
         </p:txBody>
       </p:sp>
+      <p:sp>
+        <p:nvSpPr>
+          <p:cNvPr id="4" name="Tekstvak 3"/>
+          <p:cNvSpPr txBox="1"/>
+          <p:nvPr/>
+        </p:nvSpPr>
+        <p:spPr>
+          <a:xfrm>
+            <a:off x="1862289" y="2599128"/>
+            <a:ext cx="2933286" cy="646331"/>
+          </a:xfrm>
+          <a:prstGeom prst="rect">
+            <a:avLst/>
+          </a:prstGeom>
+          <a:noFill/>
+        </p:spPr>
+        <p:txBody>
+          <a:bodyPr wrap="square" rtlCol="0">
+            <a:spAutoFit/>
+          </a:bodyPr>
+          <a:lstStyle/>
+          <a:p>
+            <a:r>
+              <a:rPr lang="en-US" sz="3600" dirty="0" err="1" smtClean="0"/>
+              <a:t>CoffeeScript</a:t>
+            </a:r>
+            <a:endParaRPr lang="en-US" sz="3600" dirty="0"/>
+          </a:p>
+        </p:txBody>
+      </p:sp>
+      <p:sp>
+        <p:nvSpPr>
+          <p:cNvPr id="5" name="Tekstvak 4"/>
+          <p:cNvSpPr txBox="1"/>
+          <p:nvPr/>
+        </p:nvSpPr>
+        <p:spPr>
+          <a:xfrm>
+            <a:off x="5252231" y="2599128"/>
+            <a:ext cx="2182650" cy="646331"/>
+          </a:xfrm>
+          <a:prstGeom prst="rect">
+            <a:avLst/>
+          </a:prstGeom>
+          <a:noFill/>
+        </p:spPr>
+        <p:txBody>
+          <a:bodyPr wrap="none" rtlCol="0">
+            <a:spAutoFit/>
+          </a:bodyPr>
+          <a:lstStyle/>
+          <a:p>
+            <a:r>
+              <a:rPr lang="en-US" sz="3600" dirty="0" err="1" smtClean="0"/>
+              <a:t>RequireJS</a:t>
+            </a:r>
+            <a:endParaRPr lang="en-US" sz="3600" dirty="0"/>
+          </a:p>
+        </p:txBody>
+      </p:sp>
+      <p:sp>
+        <p:nvSpPr>
+          <p:cNvPr id="7" name="Tekstvak 6"/>
+          <p:cNvSpPr txBox="1"/>
+          <p:nvPr/>
+        </p:nvSpPr>
+        <p:spPr>
+          <a:xfrm>
+            <a:off x="3937007" y="1692005"/>
+            <a:ext cx="1717137" cy="646331"/>
+          </a:xfrm>
+          <a:prstGeom prst="rect">
+            <a:avLst/>
+          </a:prstGeom>
+          <a:noFill/>
+        </p:spPr>
+        <p:txBody>
+          <a:bodyPr wrap="none" rtlCol="0">
+            <a:spAutoFit/>
+          </a:bodyPr>
+          <a:lstStyle/>
+          <a:p>
+            <a:r>
+              <a:rPr lang="en-US" sz="3600" dirty="0" smtClean="0"/>
+              <a:t>Node.js</a:t>
+            </a:r>
+          </a:p>
+        </p:txBody>
+      </p:sp>
+      <p:sp>
+        <p:nvSpPr>
+          <p:cNvPr id="8" name="Tekstvak 7"/>
+          <p:cNvSpPr txBox="1"/>
+          <p:nvPr/>
+        </p:nvSpPr>
+        <p:spPr>
+          <a:xfrm>
+            <a:off x="2054080" y="3715747"/>
+            <a:ext cx="1655839" cy="584775"/>
+          </a:xfrm>
+          <a:prstGeom prst="rect">
+            <a:avLst/>
+          </a:prstGeom>
+          <a:noFill/>
+        </p:spPr>
+        <p:txBody>
+          <a:bodyPr wrap="none" rtlCol="0">
+            <a:spAutoFit/>
+          </a:bodyPr>
+          <a:lstStyle/>
+          <a:p>
+            <a:r>
+              <a:rPr lang="en-US" sz="3200" dirty="0" smtClean="0"/>
+              <a:t>Three.js</a:t>
+            </a:r>
+            <a:endParaRPr lang="en-US" sz="3200" dirty="0"/>
+          </a:p>
+        </p:txBody>
+      </p:sp>
+      <p:sp>
+        <p:nvSpPr>
+          <p:cNvPr id="9" name="Tekstvak 8"/>
+          <p:cNvSpPr txBox="1"/>
+          <p:nvPr/>
+        </p:nvSpPr>
+        <p:spPr>
+          <a:xfrm>
+            <a:off x="1291556" y="4523647"/>
+            <a:ext cx="1141466" cy="461665"/>
+          </a:xfrm>
+          <a:prstGeom prst="rect">
+            <a:avLst/>
+          </a:prstGeom>
+          <a:noFill/>
+        </p:spPr>
+        <p:txBody>
+          <a:bodyPr wrap="none" rtlCol="0">
+            <a:spAutoFit/>
+          </a:bodyPr>
+          <a:lstStyle/>
+          <a:p>
+            <a:r>
+              <a:rPr lang="en-US" dirty="0" err="1" smtClean="0"/>
+              <a:t>WebGL</a:t>
+            </a:r>
+            <a:endParaRPr lang="en-US" dirty="0"/>
+          </a:p>
+        </p:txBody>
+      </p:sp>
+      <p:sp>
+        <p:nvSpPr>
+          <p:cNvPr id="12" name="Tekstvak 11"/>
+          <p:cNvSpPr txBox="1"/>
+          <p:nvPr/>
+        </p:nvSpPr>
+        <p:spPr>
+          <a:xfrm>
+            <a:off x="5452960" y="3777301"/>
+            <a:ext cx="1508233" cy="461665"/>
+          </a:xfrm>
+          <a:prstGeom prst="rect">
+            <a:avLst/>
+          </a:prstGeom>
+          <a:noFill/>
+        </p:spPr>
+        <p:txBody>
+          <a:bodyPr wrap="none" rtlCol="0">
+            <a:spAutoFit/>
+          </a:bodyPr>
+          <a:lstStyle/>
+          <a:p>
+            <a:r>
+              <a:rPr lang="en-US" dirty="0" smtClean="0"/>
+              <a:t>Socket.IO</a:t>
+            </a:r>
+            <a:endParaRPr lang="en-US" dirty="0"/>
+          </a:p>
+        </p:txBody>
+      </p:sp>
+      <p:sp>
+        <p:nvSpPr>
+          <p:cNvPr id="13" name="Tekstvak 12"/>
+          <p:cNvSpPr txBox="1"/>
+          <p:nvPr/>
+        </p:nvSpPr>
+        <p:spPr>
+          <a:xfrm>
+            <a:off x="5452960" y="4508257"/>
+            <a:ext cx="1817422" cy="461665"/>
+          </a:xfrm>
+          <a:prstGeom prst="rect">
+            <a:avLst/>
+          </a:prstGeom>
+          <a:noFill/>
+        </p:spPr>
+        <p:txBody>
+          <a:bodyPr wrap="none" rtlCol="0">
+            <a:spAutoFit/>
+          </a:bodyPr>
+          <a:lstStyle/>
+          <a:p>
+            <a:r>
+              <a:rPr lang="en-US" dirty="0" err="1" smtClean="0"/>
+              <a:t>WebSockets</a:t>
+            </a:r>
+            <a:endParaRPr lang="en-US" dirty="0"/>
+          </a:p>
+        </p:txBody>
+      </p:sp>
+      <p:sp>
+        <p:nvSpPr>
+          <p:cNvPr id="14" name="Tekstvak 13"/>
+          <p:cNvSpPr txBox="1"/>
+          <p:nvPr/>
+        </p:nvSpPr>
+        <p:spPr>
+          <a:xfrm>
+            <a:off x="3289277" y="4523647"/>
+            <a:ext cx="1282723" cy="430887"/>
+          </a:xfrm>
+          <a:prstGeom prst="rect">
+            <a:avLst/>
+          </a:prstGeom>
+          <a:noFill/>
+        </p:spPr>
+        <p:txBody>
+          <a:bodyPr wrap="none" rtlCol="0">
+            <a:spAutoFit/>
+          </a:bodyPr>
+          <a:lstStyle/>
+          <a:p>
+            <a:r>
+              <a:rPr lang="en-US" sz="2200" dirty="0" err="1" smtClean="0"/>
+              <a:t>KineticJS</a:t>
+            </a:r>
+            <a:endParaRPr lang="en-US" sz="2200" dirty="0"/>
+          </a:p>
+        </p:txBody>
+      </p:sp>
+      <p:sp>
+        <p:nvSpPr>
+          <p:cNvPr id="15" name="Tekstvak 14"/>
+          <p:cNvSpPr txBox="1"/>
+          <p:nvPr/>
+        </p:nvSpPr>
+        <p:spPr>
+          <a:xfrm>
+            <a:off x="7434881" y="3777301"/>
+            <a:ext cx="1521763" cy="461665"/>
+          </a:xfrm>
+          <a:prstGeom prst="rect">
+            <a:avLst/>
+          </a:prstGeom>
+          <a:noFill/>
+        </p:spPr>
+        <p:txBody>
+          <a:bodyPr wrap="none" rtlCol="0">
+            <a:spAutoFit/>
+          </a:bodyPr>
+          <a:lstStyle/>
+          <a:p>
+            <a:r>
+              <a:rPr lang="en-US" dirty="0" smtClean="0"/>
+              <a:t>Adapter.js</a:t>
+            </a:r>
+            <a:endParaRPr lang="en-US" dirty="0"/>
+          </a:p>
+        </p:txBody>
+      </p:sp>
+      <p:sp>
+        <p:nvSpPr>
+          <p:cNvPr id="16" name="Tekstvak 15"/>
+          <p:cNvSpPr txBox="1"/>
+          <p:nvPr/>
+        </p:nvSpPr>
+        <p:spPr>
+          <a:xfrm>
+            <a:off x="5935560" y="821351"/>
+            <a:ext cx="2584682" cy="461665"/>
+          </a:xfrm>
+          <a:prstGeom prst="rect">
+            <a:avLst/>
+          </a:prstGeom>
+          <a:noFill/>
+        </p:spPr>
+        <p:txBody>
+          <a:bodyPr wrap="none" rtlCol="0">
+            <a:spAutoFit/>
+          </a:bodyPr>
+          <a:lstStyle/>
+          <a:p>
+            <a:r>
+              <a:rPr lang="en-US" dirty="0" smtClean="0"/>
+              <a:t>Application Cache</a:t>
+            </a:r>
+            <a:endParaRPr lang="en-US" dirty="0"/>
+          </a:p>
+        </p:txBody>
+      </p:sp>
+      <p:sp>
+        <p:nvSpPr>
+          <p:cNvPr id="17" name="Tekstvak 16"/>
+          <p:cNvSpPr txBox="1"/>
+          <p:nvPr/>
+        </p:nvSpPr>
+        <p:spPr>
+          <a:xfrm>
+            <a:off x="3397416" y="5281182"/>
+            <a:ext cx="1066447" cy="430887"/>
+          </a:xfrm>
+          <a:prstGeom prst="rect">
+            <a:avLst/>
+          </a:prstGeom>
+          <a:noFill/>
+        </p:spPr>
+        <p:txBody>
+          <a:bodyPr wrap="none" rtlCol="0">
+            <a:spAutoFit/>
+          </a:bodyPr>
+          <a:lstStyle/>
+          <a:p>
+            <a:r>
+              <a:rPr lang="en-US" sz="2200" dirty="0" smtClean="0"/>
+              <a:t>Canvas</a:t>
+            </a:r>
+            <a:endParaRPr lang="en-US" sz="2200" dirty="0"/>
+          </a:p>
+        </p:txBody>
+      </p:sp>
+      <p:sp>
+        <p:nvSpPr>
+          <p:cNvPr id="19" name="Tekstvak 18"/>
+          <p:cNvSpPr txBox="1"/>
+          <p:nvPr/>
+        </p:nvSpPr>
+        <p:spPr>
+          <a:xfrm>
+            <a:off x="6310695" y="251791"/>
+            <a:ext cx="1718868" cy="461665"/>
+          </a:xfrm>
+          <a:prstGeom prst="rect">
+            <a:avLst/>
+          </a:prstGeom>
+          <a:noFill/>
+        </p:spPr>
+        <p:txBody>
+          <a:bodyPr wrap="none" rtlCol="0">
+            <a:spAutoFit/>
+          </a:bodyPr>
+          <a:lstStyle/>
+          <a:p>
+            <a:r>
+              <a:rPr lang="en-US" dirty="0" smtClean="0"/>
+              <a:t>Underscore</a:t>
+            </a:r>
+            <a:endParaRPr lang="en-US" dirty="0"/>
+          </a:p>
+        </p:txBody>
+      </p:sp>
     </p:spTree>
     <p:extLst>
       <p:ext uri="{BB962C8B-B14F-4D97-AF65-F5344CB8AC3E}">
-        <p14:creationId xmlns:p14="http://schemas.microsoft.com/office/powerpoint/2010/main" val="3138087348"/>
+        <p14:creationId xmlns:p14="http://schemas.microsoft.com/office/powerpoint/2010/main" val="4069369230"/>
       </p:ext>
     </p:extLst>
   </p:cSld>
@@ -6851,22 +7366,19 @@
           <a:p>
             <a:r>
               <a:rPr lang="en-GB" dirty="0" smtClean="0"/>
-              <a:t>Conclusion</a:t>
+              <a:t>Quality and </a:t>
+            </a:r>
+            <a:r>
+              <a:rPr lang="en-GB" dirty="0" smtClean="0"/>
+              <a:t>Testing</a:t>
+            </a:r>
+            <a:r>
+              <a:rPr lang="en-GB" dirty="0" smtClean="0"/>
+              <a:t/>
             </a:r>
             <a:br>
               <a:rPr lang="en-GB" dirty="0" smtClean="0"/>
             </a:br>
-            <a:r>
-              <a:rPr lang="en-GB" sz="2400" dirty="0" smtClean="0">
-                <a:solidFill>
-                  <a:schemeClr val="accent6">
-                    <a:lumMod val="50000"/>
-                    <a:lumOff val="50000"/>
-                  </a:schemeClr>
-                </a:solidFill>
-              </a:rPr>
-              <a:t>Reflection on research question</a:t>
-            </a:r>
             <a:endParaRPr lang="en-GB" sz="2400" dirty="0">
               <a:solidFill>
                 <a:schemeClr val="accent6">
@@ -6895,63 +7407,77 @@
           <a:p>
             <a:pPr lvl="1"/>
             <a:r>
-              <a:rPr lang="en-US" dirty="0" smtClean="0"/>
-              <a:t>In </a:t>
-            </a:r>
-            <a:r>
-              <a:rPr lang="en-US" dirty="0"/>
-              <a:t>what way can one create a dynamic peer-to-peer multiplayer-game-network-topology that scales with the amount of users participating by only using WebRTC</a:t>
-            </a:r>
-            <a:r>
-              <a:rPr lang="en-US" dirty="0" smtClean="0"/>
-              <a:t>?</a:t>
-            </a:r>
-          </a:p>
-          <a:p>
-            <a:pPr marL="766763" lvl="2" indent="0">
-              <a:buNone/>
-            </a:pPr>
-            <a:endParaRPr lang="en-US" dirty="0" smtClean="0"/>
+              <a:rPr lang="en-GB" dirty="0" smtClean="0"/>
+              <a:t>Jasmine for BDD</a:t>
+            </a:r>
+          </a:p>
+          <a:p>
+            <a:pPr lvl="1"/>
+            <a:r>
+              <a:rPr lang="en-GB" dirty="0" err="1" smtClean="0"/>
+              <a:t>CoDo</a:t>
+            </a:r>
+            <a:r>
+              <a:rPr lang="en-GB" dirty="0" smtClean="0"/>
+              <a:t> for documentation</a:t>
+            </a:r>
+          </a:p>
+          <a:p>
+            <a:pPr lvl="1"/>
+            <a:r>
+              <a:rPr lang="en-GB" dirty="0" smtClean="0"/>
+              <a:t>Internal tools</a:t>
+            </a:r>
           </a:p>
           <a:p>
             <a:pPr lvl="2"/>
             <a:r>
-              <a:rPr lang="en-US" dirty="0"/>
-              <a:t>How can all data reach all peers in a bandwidth-efficient way?</a:t>
+              <a:rPr lang="en-GB" dirty="0" smtClean="0"/>
+              <a:t>Node Inspector</a:t>
             </a:r>
           </a:p>
           <a:p>
             <a:pPr lvl="2"/>
             <a:r>
-              <a:rPr lang="en-US" dirty="0" smtClean="0"/>
-              <a:t>How </a:t>
-            </a:r>
-            <a:r>
-              <a:rPr lang="en-US" dirty="0"/>
-              <a:t>can one distribute essential network tasks over all peers</a:t>
-            </a:r>
-            <a:r>
-              <a:rPr lang="en-US" dirty="0" smtClean="0"/>
-              <a:t>?</a:t>
+              <a:rPr lang="en-GB" dirty="0" smtClean="0"/>
+              <a:t>Map</a:t>
             </a:r>
           </a:p>
           <a:p>
             <a:pPr lvl="2"/>
             <a:r>
-              <a:rPr lang="en-US" dirty="0" smtClean="0"/>
-              <a:t>How </a:t>
-            </a:r>
-            <a:r>
-              <a:rPr lang="en-US" dirty="0"/>
-              <a:t>can the impact of unpredictable circumstances (peers suddenly leaving the network) be reduced</a:t>
-            </a:r>
-            <a:r>
-              <a:rPr lang="en-US" dirty="0" smtClean="0"/>
-              <a:t>?</a:t>
-            </a:r>
-          </a:p>
-          <a:p>
-            <a:pPr lvl="2"/>
+              <a:rPr lang="en-GB" dirty="0" smtClean="0"/>
+              <a:t>Game bots</a:t>
+            </a:r>
+          </a:p>
+          <a:p>
+            <a:pPr lvl="1"/>
+            <a:r>
+              <a:rPr lang="en-GB" dirty="0" err="1" smtClean="0"/>
+              <a:t>JSCoverage</a:t>
+            </a:r>
+            <a:r>
+              <a:rPr lang="en-GB" dirty="0" smtClean="0"/>
+              <a:t> for coverage reports</a:t>
+            </a:r>
+          </a:p>
+          <a:p>
+            <a:pPr lvl="1"/>
+            <a:r>
+              <a:rPr lang="en-GB" dirty="0" smtClean="0"/>
+              <a:t>cake for building</a:t>
+            </a:r>
+          </a:p>
+          <a:p>
+            <a:pPr lvl="1"/>
+            <a:r>
+              <a:rPr lang="en-GB" dirty="0" err="1" smtClean="0"/>
+              <a:t>CoffeeLint</a:t>
+            </a:r>
+            <a:r>
+              <a:rPr lang="en-GB" dirty="0" smtClean="0"/>
+              <a:t> for </a:t>
+            </a:r>
             <a:endParaRPr lang="en-GB" dirty="0"/>
           </a:p>
         </p:txBody>
@@ -7060,15 +7586,21 @@
                   </a:schemeClr>
                 </a:solidFill>
               </a:rPr>
-              <a:t>Game ● Technology ● Quality &amp; Testing ● </a:t>
+              <a:t>Game ● Technology ● </a:t>
             </a:r>
             <a:r>
               <a:rPr lang="en-GB" sz="1400" b="1" baseline="0" dirty="0" smtClean="0"/>
-              <a:t>Conclusion</a:t>
-            </a:r>
-            <a:r>
-              <a:rPr lang="en-GB" sz="1200" baseline="0" dirty="0" smtClean="0"/>
-              <a:t> </a:t>
+              <a:t>Quality &amp; Testing</a:t>
+            </a:r>
+            <a:r>
+              <a:rPr lang="en-GB" sz="1200" baseline="0" dirty="0" smtClean="0">
+                <a:solidFill>
+                  <a:schemeClr val="bg1">
+                    <a:lumMod val="65000"/>
+                  </a:schemeClr>
+                </a:solidFill>
+              </a:rPr>
+              <a:t> ● Conclusion </a:t>
             </a:r>
             <a:r>
               <a:rPr lang="en-GB" sz="1200" dirty="0" smtClean="0">
@@ -7093,7 +7625,7 @@
     </p:spTree>
     <p:extLst>
       <p:ext uri="{BB962C8B-B14F-4D97-AF65-F5344CB8AC3E}">
-        <p14:creationId xmlns:p14="http://schemas.microsoft.com/office/powerpoint/2010/main" val="1079515115"/>
+        <p14:creationId xmlns:p14="http://schemas.microsoft.com/office/powerpoint/2010/main" val="3138087348"/>
       </p:ext>
     </p:extLst>
   </p:cSld>
@@ -7144,6 +7676,626 @@
           <a:p>
             <a:r>
               <a:rPr lang="en-GB" dirty="0" smtClean="0"/>
+              <a:t>Quality and Testing</a:t>
+            </a:r>
+            <a:br>
+              <a:rPr lang="en-GB" dirty="0" smtClean="0"/>
+            </a:br>
+            <a:r>
+              <a:rPr lang="en-GB" sz="2400" dirty="0" smtClean="0">
+                <a:solidFill>
+                  <a:schemeClr val="accent6">
+                    <a:lumMod val="50000"/>
+                    <a:lumOff val="50000"/>
+                  </a:schemeClr>
+                </a:solidFill>
+              </a:rPr>
+              <a:t>External </a:t>
+            </a:r>
+            <a:r>
+              <a:rPr lang="en-GB" sz="2400" dirty="0" err="1" smtClean="0">
+                <a:solidFill>
+                  <a:schemeClr val="accent6">
+                    <a:lumMod val="50000"/>
+                    <a:lumOff val="50000"/>
+                  </a:schemeClr>
+                </a:solidFill>
+              </a:rPr>
+              <a:t>codereview</a:t>
+            </a:r>
+            <a:endParaRPr lang="en-GB" sz="2400" dirty="0">
+              <a:solidFill>
+                <a:schemeClr val="accent6">
+                  <a:lumMod val="50000"/>
+                  <a:lumOff val="50000"/>
+                </a:schemeClr>
+              </a:solidFill>
+            </a:endParaRPr>
+          </a:p>
+        </p:txBody>
+      </p:sp>
+      <p:sp>
+        <p:nvSpPr>
+          <p:cNvPr id="3" name="Content Placeholder 2"/>
+          <p:cNvSpPr>
+            <a:spLocks noGrp="1"/>
+          </p:cNvSpPr>
+          <p:nvPr>
+            <p:ph idx="1"/>
+          </p:nvPr>
+        </p:nvSpPr>
+        <p:spPr/>
+        <p:txBody>
+          <a:bodyPr/>
+          <a:lstStyle/>
+          <a:p>
+            <a:pPr lvl="1"/>
+            <a:r>
+              <a:rPr lang="en-GB" dirty="0" smtClean="0"/>
+              <a:t>Software Improvement Group</a:t>
+            </a:r>
+          </a:p>
+          <a:p>
+            <a:pPr lvl="1"/>
+            <a:endParaRPr lang="en-GB" dirty="0"/>
+          </a:p>
+          <a:p>
+            <a:pPr lvl="1"/>
+            <a:r>
+              <a:rPr lang="en-GB" dirty="0" smtClean="0"/>
+              <a:t>After review 1:</a:t>
+            </a:r>
+          </a:p>
+          <a:p>
+            <a:pPr lvl="2"/>
+            <a:r>
+              <a:rPr lang="en-GB" dirty="0" smtClean="0"/>
+              <a:t>Game and Library split up</a:t>
+            </a:r>
+          </a:p>
+          <a:p>
+            <a:pPr lvl="2"/>
+            <a:r>
+              <a:rPr lang="en-GB" dirty="0" smtClean="0"/>
+              <a:t>Shortened long functions</a:t>
+            </a:r>
+          </a:p>
+          <a:p>
+            <a:pPr lvl="2"/>
+            <a:r>
+              <a:rPr lang="en-GB" dirty="0" smtClean="0"/>
+              <a:t>Added documentation</a:t>
+            </a:r>
+          </a:p>
+          <a:p>
+            <a:pPr lvl="2"/>
+            <a:r>
+              <a:rPr lang="en-GB" dirty="0" smtClean="0"/>
+              <a:t>Code duplication not reduced</a:t>
+            </a:r>
+          </a:p>
+          <a:p>
+            <a:pPr lvl="1"/>
+            <a:endParaRPr lang="en-GB" dirty="0"/>
+          </a:p>
+          <a:p>
+            <a:pPr lvl="1"/>
+            <a:r>
+              <a:rPr lang="en-GB" dirty="0" smtClean="0"/>
+              <a:t>Review 2:</a:t>
+            </a:r>
+          </a:p>
+          <a:p>
+            <a:pPr lvl="2"/>
+            <a:r>
+              <a:rPr lang="en-GB" dirty="0" smtClean="0"/>
+              <a:t>Not happy with code duplication</a:t>
+            </a:r>
+          </a:p>
+          <a:p>
+            <a:pPr lvl="2"/>
+            <a:r>
+              <a:rPr lang="en-GB" dirty="0" smtClean="0"/>
+              <a:t>Still a few long functions</a:t>
+            </a:r>
+          </a:p>
+          <a:p>
+            <a:pPr lvl="2"/>
+            <a:r>
+              <a:rPr lang="en-GB" dirty="0" smtClean="0"/>
+              <a:t>Could determine a positive change compared to review 1</a:t>
+            </a:r>
+            <a:endParaRPr lang="en-GB" dirty="0"/>
+          </a:p>
+        </p:txBody>
+      </p:sp>
+      <p:sp>
+        <p:nvSpPr>
+          <p:cNvPr id="6" name="TextBox 5"/>
+          <p:cNvSpPr txBox="1"/>
+          <p:nvPr/>
+        </p:nvSpPr>
+        <p:spPr>
+          <a:xfrm>
+            <a:off x="0" y="5764306"/>
+            <a:ext cx="9144000" cy="307777"/>
+          </a:xfrm>
+          <a:prstGeom prst="rect">
+            <a:avLst/>
+          </a:prstGeom>
+          <a:noFill/>
+        </p:spPr>
+        <p:txBody>
+          <a:bodyPr wrap="square" rtlCol="0">
+            <a:spAutoFit/>
+          </a:bodyPr>
+          <a:lstStyle/>
+          <a:p>
+            <a:r>
+              <a:rPr lang="en-GB" sz="1200" dirty="0" smtClean="0">
+                <a:solidFill>
+                  <a:schemeClr val="bg1">
+                    <a:lumMod val="65000"/>
+                  </a:schemeClr>
+                </a:solidFill>
+              </a:rPr>
+              <a:t>Welcome </a:t>
+            </a:r>
+            <a:r>
+              <a:rPr lang="en-GB" sz="1200" baseline="0" dirty="0" smtClean="0">
+                <a:solidFill>
+                  <a:schemeClr val="bg1">
+                    <a:lumMod val="65000"/>
+                  </a:schemeClr>
+                </a:solidFill>
+              </a:rPr>
+              <a:t>● </a:t>
+            </a:r>
+            <a:r>
+              <a:rPr lang="en-GB" sz="1200" dirty="0" smtClean="0">
+                <a:solidFill>
+                  <a:schemeClr val="bg1">
+                    <a:lumMod val="65000"/>
+                  </a:schemeClr>
+                </a:solidFill>
+              </a:rPr>
+              <a:t>Assignment </a:t>
+            </a:r>
+            <a:r>
+              <a:rPr lang="en-GB" sz="1200" baseline="0" dirty="0" smtClean="0">
+                <a:solidFill>
+                  <a:schemeClr val="bg1">
+                    <a:lumMod val="65000"/>
+                  </a:schemeClr>
+                </a:solidFill>
+              </a:rPr>
+              <a:t>● WebRTC</a:t>
+            </a:r>
+            <a:r>
+              <a:rPr lang="en-GB" sz="1200" b="0" baseline="0" dirty="0" smtClean="0"/>
+              <a:t> </a:t>
+            </a:r>
+            <a:r>
+              <a:rPr lang="en-GB" sz="1200" b="0" baseline="0" dirty="0" smtClean="0">
+                <a:solidFill>
+                  <a:schemeClr val="bg1">
+                    <a:lumMod val="65000"/>
+                  </a:schemeClr>
+                </a:solidFill>
+              </a:rPr>
+              <a:t>● </a:t>
+            </a:r>
+            <a:r>
+              <a:rPr lang="en-GB" sz="1200" baseline="0" dirty="0" smtClean="0">
+                <a:solidFill>
+                  <a:schemeClr val="bg1">
+                    <a:lumMod val="65000"/>
+                  </a:schemeClr>
+                </a:solidFill>
+              </a:rPr>
+              <a:t>Peer-to-Peer</a:t>
+            </a:r>
+            <a:r>
+              <a:rPr lang="en-GB" sz="1200" b="0" baseline="0" dirty="0" smtClean="0">
+                <a:solidFill>
+                  <a:schemeClr val="bg1">
+                    <a:lumMod val="65000"/>
+                  </a:schemeClr>
+                </a:solidFill>
+              </a:rPr>
+              <a:t> ● </a:t>
+            </a:r>
+            <a:r>
+              <a:rPr lang="en-GB" sz="1200" baseline="0" dirty="0" smtClean="0">
+                <a:solidFill>
+                  <a:schemeClr val="bg1">
+                    <a:lumMod val="65000"/>
+                  </a:schemeClr>
+                </a:solidFill>
+              </a:rPr>
+              <a:t>Game ● Technology ● </a:t>
+            </a:r>
+            <a:r>
+              <a:rPr lang="en-GB" sz="1400" b="1" baseline="0" dirty="0" smtClean="0"/>
+              <a:t>Quality &amp; Testing</a:t>
+            </a:r>
+            <a:r>
+              <a:rPr lang="en-GB" sz="1200" baseline="0" dirty="0" smtClean="0">
+                <a:solidFill>
+                  <a:schemeClr val="bg1">
+                    <a:lumMod val="65000"/>
+                  </a:schemeClr>
+                </a:solidFill>
+              </a:rPr>
+              <a:t> ● Conclusion </a:t>
+            </a:r>
+            <a:r>
+              <a:rPr lang="en-GB" sz="1200" dirty="0" smtClean="0">
+                <a:solidFill>
+                  <a:schemeClr val="bg1">
+                    <a:lumMod val="65000"/>
+                  </a:schemeClr>
+                </a:solidFill>
+              </a:rPr>
+              <a:t>● Questions?</a:t>
+            </a:r>
+            <a:endParaRPr lang="en-GB" sz="1200" dirty="0">
+              <a:solidFill>
+                <a:schemeClr val="bg1">
+                  <a:lumMod val="65000"/>
+                </a:schemeClr>
+              </a:solidFill>
+            </a:endParaRPr>
+          </a:p>
+        </p:txBody>
+      </p:sp>
+    </p:spTree>
+    <p:extLst>
+      <p:ext uri="{BB962C8B-B14F-4D97-AF65-F5344CB8AC3E}">
+        <p14:creationId xmlns:p14="http://schemas.microsoft.com/office/powerpoint/2010/main" val="744234515"/>
+      </p:ext>
+    </p:extLst>
+  </p:cSld>
+  <p:clrMapOvr>
+    <a:masterClrMapping/>
+  </p:clrMapOvr>
+  <p:timing>
+    <p:tnLst>
+      <p:par>
+        <p:cTn id="1" dur="indefinite" restart="never" nodeType="tmRoot"/>
+      </p:par>
+    </p:tnLst>
+  </p:timing>
+</p:sld>
+</file>
+
+<file path=ppt/slides/slide14.xml><?xml version="1.0" encoding="utf-8"?>
+<p:sld xmlns:a="http://schemas.openxmlformats.org/drawingml/2006/main" xmlns:r="http://schemas.openxmlformats.org/officeDocument/2006/relationships" xmlns:p="http://schemas.openxmlformats.org/presentationml/2006/main">
+  <p:cSld>
+    <p:spTree>
+      <p:nvGrpSpPr>
+        <p:cNvPr id="1" name=""/>
+        <p:cNvGrpSpPr/>
+        <p:nvPr/>
+      </p:nvGrpSpPr>
+      <p:grpSpPr>
+        <a:xfrm>
+          <a:off x="0" y="0"/>
+          <a:ext cx="0" cy="0"/>
+          <a:chOff x="0" y="0"/>
+          <a:chExt cx="0" cy="0"/>
+        </a:xfrm>
+      </p:grpSpPr>
+      <p:sp>
+        <p:nvSpPr>
+          <p:cNvPr id="2" name="Title 1"/>
+          <p:cNvSpPr>
+            <a:spLocks noGrp="1"/>
+          </p:cNvSpPr>
+          <p:nvPr>
+            <p:ph type="title"/>
+          </p:nvPr>
+        </p:nvSpPr>
+        <p:spPr/>
+        <p:txBody>
+          <a:bodyPr/>
+          <a:lstStyle/>
+          <a:p>
+            <a:r>
+              <a:rPr lang="en-GB" dirty="0" smtClean="0"/>
+              <a:t>Conclusion</a:t>
+            </a:r>
+            <a:br>
+              <a:rPr lang="en-GB" dirty="0" smtClean="0"/>
+            </a:br>
+            <a:r>
+              <a:rPr lang="en-GB" sz="2400" dirty="0" smtClean="0">
+                <a:solidFill>
+                  <a:schemeClr val="accent6">
+                    <a:lumMod val="50000"/>
+                    <a:lumOff val="50000"/>
+                  </a:schemeClr>
+                </a:solidFill>
+              </a:rPr>
+              <a:t>Reflection on research question</a:t>
+            </a:r>
+            <a:endParaRPr lang="en-GB" sz="2400" dirty="0">
+              <a:solidFill>
+                <a:schemeClr val="accent6">
+                  <a:lumMod val="50000"/>
+                  <a:lumOff val="50000"/>
+                </a:schemeClr>
+              </a:solidFill>
+            </a:endParaRPr>
+          </a:p>
+        </p:txBody>
+      </p:sp>
+      <p:sp>
+        <p:nvSpPr>
+          <p:cNvPr id="3" name="Content Placeholder 2"/>
+          <p:cNvSpPr>
+            <a:spLocks noGrp="1"/>
+          </p:cNvSpPr>
+          <p:nvPr>
+            <p:ph idx="1"/>
+          </p:nvPr>
+        </p:nvSpPr>
+        <p:spPr/>
+        <p:txBody>
+          <a:bodyPr/>
+          <a:lstStyle/>
+          <a:p>
+            <a:pPr lvl="1"/>
+            <a:r>
+              <a:rPr lang="en-US" dirty="0" smtClean="0"/>
+              <a:t>In </a:t>
+            </a:r>
+            <a:r>
+              <a:rPr lang="en-US" dirty="0"/>
+              <a:t>what way can one create a dynamic peer-to-peer multiplayer-game-network-topology that scales with the amount of users participating by only using WebRTC</a:t>
+            </a:r>
+            <a:r>
+              <a:rPr lang="en-US" dirty="0" smtClean="0"/>
+              <a:t>?</a:t>
+            </a:r>
+          </a:p>
+          <a:p>
+            <a:pPr marL="766763" lvl="2" indent="0">
+              <a:buNone/>
+            </a:pPr>
+            <a:endParaRPr lang="en-US" dirty="0" smtClean="0"/>
+          </a:p>
+          <a:p>
+            <a:pPr lvl="2"/>
+            <a:r>
+              <a:rPr lang="en-US" dirty="0"/>
+              <a:t>How can all data reach all peers in a bandwidth-efficient way?</a:t>
+            </a:r>
+          </a:p>
+          <a:p>
+            <a:pPr lvl="2"/>
+            <a:r>
+              <a:rPr lang="en-US" dirty="0" smtClean="0"/>
+              <a:t>How </a:t>
+            </a:r>
+            <a:r>
+              <a:rPr lang="en-US" dirty="0"/>
+              <a:t>can one distribute essential network tasks over all peers</a:t>
+            </a:r>
+            <a:r>
+              <a:rPr lang="en-US" dirty="0" smtClean="0"/>
+              <a:t>?</a:t>
+            </a:r>
+          </a:p>
+          <a:p>
+            <a:pPr lvl="2"/>
+            <a:r>
+              <a:rPr lang="en-US" dirty="0" smtClean="0"/>
+              <a:t>How </a:t>
+            </a:r>
+            <a:r>
+              <a:rPr lang="en-US" dirty="0"/>
+              <a:t>can the impact of unpredictable circumstances (peers suddenly leaving the network) be reduced</a:t>
+            </a:r>
+            <a:r>
+              <a:rPr lang="en-US" dirty="0" smtClean="0"/>
+              <a:t>?</a:t>
+            </a:r>
+          </a:p>
+          <a:p>
+            <a:pPr lvl="2"/>
+            <a:endParaRPr lang="en-GB" dirty="0"/>
+          </a:p>
+        </p:txBody>
+      </p:sp>
+      <p:sp>
+        <p:nvSpPr>
+          <p:cNvPr id="6" name="TextBox 5"/>
+          <p:cNvSpPr txBox="1"/>
+          <p:nvPr/>
+        </p:nvSpPr>
+        <p:spPr>
+          <a:xfrm>
+            <a:off x="0" y="5764306"/>
+            <a:ext cx="9144000" cy="307777"/>
+          </a:xfrm>
+          <a:prstGeom prst="rect">
+            <a:avLst/>
+          </a:prstGeom>
+          <a:noFill/>
+        </p:spPr>
+        <p:txBody>
+          <a:bodyPr wrap="square" rtlCol="0">
+            <a:spAutoFit/>
+          </a:bodyPr>
+          <a:lstStyle/>
+          <a:p>
+            <a:r>
+              <a:rPr lang="en-GB" sz="1200" dirty="0" smtClean="0">
+                <a:solidFill>
+                  <a:schemeClr val="bg1">
+                    <a:lumMod val="65000"/>
+                  </a:schemeClr>
+                </a:solidFill>
+              </a:rPr>
+              <a:t>Welcome </a:t>
+            </a:r>
+            <a:r>
+              <a:rPr lang="en-GB" sz="1200" baseline="0" dirty="0" smtClean="0">
+                <a:solidFill>
+                  <a:schemeClr val="bg1">
+                    <a:lumMod val="65000"/>
+                  </a:schemeClr>
+                </a:solidFill>
+              </a:rPr>
+              <a:t>● </a:t>
+            </a:r>
+            <a:r>
+              <a:rPr lang="en-GB" sz="1200" dirty="0" smtClean="0">
+                <a:solidFill>
+                  <a:schemeClr val="bg1">
+                    <a:lumMod val="65000"/>
+                  </a:schemeClr>
+                </a:solidFill>
+              </a:rPr>
+              <a:t>Assignment </a:t>
+            </a:r>
+            <a:r>
+              <a:rPr lang="en-GB" sz="1200" baseline="0" dirty="0" smtClean="0">
+                <a:solidFill>
+                  <a:schemeClr val="bg1">
+                    <a:lumMod val="65000"/>
+                  </a:schemeClr>
+                </a:solidFill>
+              </a:rPr>
+              <a:t>● WebRTC</a:t>
+            </a:r>
+            <a:r>
+              <a:rPr lang="en-GB" sz="1200" b="0" baseline="0" dirty="0" smtClean="0"/>
+              <a:t> </a:t>
+            </a:r>
+            <a:r>
+              <a:rPr lang="en-GB" sz="1200" b="0" baseline="0" dirty="0" smtClean="0">
+                <a:solidFill>
+                  <a:schemeClr val="bg1">
+                    <a:lumMod val="65000"/>
+                  </a:schemeClr>
+                </a:solidFill>
+              </a:rPr>
+              <a:t>● </a:t>
+            </a:r>
+            <a:r>
+              <a:rPr lang="en-GB" sz="1200" baseline="0" dirty="0" smtClean="0">
+                <a:solidFill>
+                  <a:schemeClr val="bg1">
+                    <a:lumMod val="65000"/>
+                  </a:schemeClr>
+                </a:solidFill>
+              </a:rPr>
+              <a:t>Peer-to-Peer</a:t>
+            </a:r>
+            <a:r>
+              <a:rPr lang="en-GB" sz="1200" b="0" baseline="0" dirty="0" smtClean="0">
+                <a:solidFill>
+                  <a:schemeClr val="bg1">
+                    <a:lumMod val="65000"/>
+                  </a:schemeClr>
+                </a:solidFill>
+              </a:rPr>
+              <a:t> ● </a:t>
+            </a:r>
+            <a:r>
+              <a:rPr lang="en-GB" sz="1200" baseline="0" dirty="0" smtClean="0">
+                <a:solidFill>
+                  <a:schemeClr val="bg1">
+                    <a:lumMod val="65000"/>
+                  </a:schemeClr>
+                </a:solidFill>
+              </a:rPr>
+              <a:t>Game ● Technology ● Quality &amp; Testing ● </a:t>
+            </a:r>
+            <a:r>
+              <a:rPr lang="en-GB" sz="1400" b="1" baseline="0" dirty="0" smtClean="0"/>
+              <a:t>Conclusion</a:t>
+            </a:r>
+            <a:r>
+              <a:rPr lang="en-GB" sz="1200" baseline="0" dirty="0" smtClean="0"/>
+              <a:t> </a:t>
+            </a:r>
+            <a:r>
+              <a:rPr lang="en-GB" sz="1200" dirty="0" smtClean="0">
+                <a:solidFill>
+                  <a:schemeClr val="bg1">
+                    <a:lumMod val="65000"/>
+                  </a:schemeClr>
+                </a:solidFill>
+              </a:rPr>
+              <a:t>● Questions?</a:t>
+            </a:r>
+            <a:endParaRPr lang="en-GB" sz="1200" dirty="0">
+              <a:solidFill>
+                <a:schemeClr val="bg1">
+                  <a:lumMod val="65000"/>
+                </a:schemeClr>
+              </a:solidFill>
+            </a:endParaRPr>
+          </a:p>
+        </p:txBody>
+      </p:sp>
+    </p:spTree>
+    <p:extLst>
+      <p:ext uri="{BB962C8B-B14F-4D97-AF65-F5344CB8AC3E}">
+        <p14:creationId xmlns:p14="http://schemas.microsoft.com/office/powerpoint/2010/main" val="1079515115"/>
+      </p:ext>
+    </p:extLst>
+  </p:cSld>
+  <p:clrMapOvr>
+    <a:masterClrMapping/>
+  </p:clrMapOvr>
+  <p:timing>
+    <p:tnLst>
+      <p:par>
+        <p:cTn id="1" dur="indefinite" restart="never" nodeType="tmRoot"/>
+      </p:par>
+    </p:tnLst>
+  </p:timing>
+</p:sld>
+</file>
+
+<file path=ppt/slides/slide15.xml><?xml version="1.0" encoding="utf-8"?>
+<p:sld xmlns:a="http://schemas.openxmlformats.org/drawingml/2006/main" xmlns:r="http://schemas.openxmlformats.org/officeDocument/2006/relationships" xmlns:p="http://schemas.openxmlformats.org/presentationml/2006/main">
+  <p:cSld>
+    <p:spTree>
+      <p:nvGrpSpPr>
+        <p:cNvPr id="1" name=""/>
+        <p:cNvGrpSpPr/>
+        <p:nvPr/>
+      </p:nvGrpSpPr>
+      <p:grpSpPr>
+        <a:xfrm>
+          <a:off x="0" y="0"/>
+          <a:ext cx="0" cy="0"/>
+          <a:chOff x="0" y="0"/>
+          <a:chExt cx="0" cy="0"/>
+        </a:xfrm>
+      </p:grpSpPr>
+      <p:sp>
+        <p:nvSpPr>
+          <p:cNvPr id="2" name="Title 1"/>
+          <p:cNvSpPr>
+            <a:spLocks noGrp="1"/>
+          </p:cNvSpPr>
+          <p:nvPr>
+            <p:ph type="title"/>
+          </p:nvPr>
+        </p:nvSpPr>
+        <p:spPr/>
+        <p:txBody>
+          <a:bodyPr/>
+          <a:lstStyle/>
+          <a:p>
+            <a:r>
+              <a:rPr lang="en-GB" dirty="0" smtClean="0"/>
               <a:t>Conclusion</a:t>
             </a:r>
             <a:br>
@@ -7407,7 +8559,7 @@
 </p:sld>
 </file>
 
-<file path=ppt/slides/slide14.xml><?xml version="1.0" encoding="utf-8"?>
+<file path=ppt/slides/slide16.xml><?xml version="1.0" encoding="utf-8"?>
 <p:sld xmlns:a="http://schemas.openxmlformats.org/drawingml/2006/main" xmlns:r="http://schemas.openxmlformats.org/officeDocument/2006/relationships" xmlns:p="http://schemas.openxmlformats.org/presentationml/2006/main">
   <p:cSld>
     <p:spTree>
@@ -9556,7 +10708,29 @@
                   </a:schemeClr>
                 </a:solidFill>
               </a:rPr>
-              <a:t>subtitle</a:t>
+              <a:t>Implementing our </a:t>
+            </a:r>
+            <a:r>
+              <a:rPr lang="en-GB" sz="2400" dirty="0" err="1" smtClean="0">
+                <a:solidFill>
+                  <a:schemeClr val="accent6">
+                    <a:lumMod val="50000"/>
+                    <a:lumOff val="50000"/>
+                  </a:schemeClr>
+                </a:solidFill>
+              </a:rPr>
+              <a:t>WebRTC</a:t>
+            </a:r>
+            <a:r>
+              <a:rPr lang="en-GB" sz="2400" dirty="0" smtClean="0">
+                <a:solidFill>
+                  <a:schemeClr val="accent6">
+                    <a:lumMod val="50000"/>
+                    <a:lumOff val="50000"/>
+                  </a:schemeClr>
+                </a:solidFill>
+              </a:rPr>
+              <a:t> library</a:t>
             </a:r>
             <a:endParaRPr lang="en-GB" sz="2400" dirty="0">
               <a:solidFill>
@@ -9585,7 +10759,40 @@
           <a:lstStyle/>
           <a:p>
             <a:pPr lvl="1"/>
+            <a:r>
+              <a:rPr lang="en-GB" dirty="0" smtClean="0"/>
+              <a:t>Game concept</a:t>
+            </a:r>
+          </a:p>
+          <a:p>
+            <a:pPr lvl="2"/>
+            <a:r>
+              <a:rPr lang="en-GB" dirty="0" smtClean="0"/>
+              <a:t>3D arcade shooter</a:t>
+            </a:r>
+          </a:p>
+          <a:p>
+            <a:pPr lvl="1"/>
+            <a:r>
+              <a:rPr lang="en-GB" dirty="0" smtClean="0"/>
+              <a:t>Network utilisation</a:t>
+            </a:r>
+          </a:p>
+          <a:p>
+            <a:pPr lvl="1"/>
+            <a:r>
+              <a:rPr lang="en-GB" dirty="0" err="1" smtClean="0"/>
+              <a:t>WebGL</a:t>
+            </a:r>
+            <a:r>
+              <a:rPr lang="en-GB" dirty="0" smtClean="0"/>
+              <a:t> graphics engine</a:t>
+            </a:r>
             <a:endParaRPr lang="en-GB" dirty="0"/>
+          </a:p>
+          <a:p>
+            <a:pPr lvl="1"/>
+            <a:endParaRPr lang="en-GB" dirty="0" smtClean="0"/>
           </a:p>
         </p:txBody>
       </p:sp>

</xml_diff>